<commit_message>
Change Volume Mgmt with I2C bus.
Instead of using GPIO from Teensy 2++,
use I2C and PCF8574 I2C I/O expander
to manage volume.

Signed-off-by: Trivelly <jean.trivelly@gmail.com>
</commit_message>
<xml_diff>
--- a/Preamp_Arch.pptx
+++ b/Preamp_Arch.pptx
@@ -245,7 +245,7 @@
           <a:p>
             <a:fld id="{43AD7C33-C558-4392-912A-45ED6039CB4D}" type="datetimeFigureOut">
               <a:rPr lang="fr-FR" smtClean="0"/>
-              <a:t>03/08/2016</a:t>
+              <a:t>12/01/2017</a:t>
             </a:fld>
             <a:endParaRPr lang="fr-FR"/>
           </a:p>
@@ -287,7 +287,7 @@
           <a:p>
             <a:fld id="{76531600-BD36-44DA-BBB5-C06D17DDD171}" type="slidenum">
               <a:rPr lang="fr-FR" smtClean="0"/>
-              <a:t>‹N°›</a:t>
+              <a:t>‹#›</a:t>
             </a:fld>
             <a:endParaRPr lang="fr-FR"/>
           </a:p>
@@ -415,7 +415,7 @@
           <a:p>
             <a:fld id="{43AD7C33-C558-4392-912A-45ED6039CB4D}" type="datetimeFigureOut">
               <a:rPr lang="fr-FR" smtClean="0"/>
-              <a:t>03/08/2016</a:t>
+              <a:t>12/01/2017</a:t>
             </a:fld>
             <a:endParaRPr lang="fr-FR"/>
           </a:p>
@@ -457,7 +457,7 @@
           <a:p>
             <a:fld id="{76531600-BD36-44DA-BBB5-C06D17DDD171}" type="slidenum">
               <a:rPr lang="fr-FR" smtClean="0"/>
-              <a:t>‹N°›</a:t>
+              <a:t>‹#›</a:t>
             </a:fld>
             <a:endParaRPr lang="fr-FR"/>
           </a:p>
@@ -595,7 +595,7 @@
           <a:p>
             <a:fld id="{43AD7C33-C558-4392-912A-45ED6039CB4D}" type="datetimeFigureOut">
               <a:rPr lang="fr-FR" smtClean="0"/>
-              <a:t>03/08/2016</a:t>
+              <a:t>12/01/2017</a:t>
             </a:fld>
             <a:endParaRPr lang="fr-FR"/>
           </a:p>
@@ -637,7 +637,7 @@
           <a:p>
             <a:fld id="{76531600-BD36-44DA-BBB5-C06D17DDD171}" type="slidenum">
               <a:rPr lang="fr-FR" smtClean="0"/>
-              <a:t>‹N°›</a:t>
+              <a:t>‹#›</a:t>
             </a:fld>
             <a:endParaRPr lang="fr-FR"/>
           </a:p>
@@ -765,7 +765,7 @@
           <a:p>
             <a:fld id="{43AD7C33-C558-4392-912A-45ED6039CB4D}" type="datetimeFigureOut">
               <a:rPr lang="fr-FR" smtClean="0"/>
-              <a:t>03/08/2016</a:t>
+              <a:t>12/01/2017</a:t>
             </a:fld>
             <a:endParaRPr lang="fr-FR"/>
           </a:p>
@@ -807,7 +807,7 @@
           <a:p>
             <a:fld id="{76531600-BD36-44DA-BBB5-C06D17DDD171}" type="slidenum">
               <a:rPr lang="fr-FR" smtClean="0"/>
-              <a:t>‹N°›</a:t>
+              <a:t>‹#›</a:t>
             </a:fld>
             <a:endParaRPr lang="fr-FR"/>
           </a:p>
@@ -1011,7 +1011,7 @@
           <a:p>
             <a:fld id="{43AD7C33-C558-4392-912A-45ED6039CB4D}" type="datetimeFigureOut">
               <a:rPr lang="fr-FR" smtClean="0"/>
-              <a:t>03/08/2016</a:t>
+              <a:t>12/01/2017</a:t>
             </a:fld>
             <a:endParaRPr lang="fr-FR"/>
           </a:p>
@@ -1053,7 +1053,7 @@
           <a:p>
             <a:fld id="{76531600-BD36-44DA-BBB5-C06D17DDD171}" type="slidenum">
               <a:rPr lang="fr-FR" smtClean="0"/>
-              <a:t>‹N°›</a:t>
+              <a:t>‹#›</a:t>
             </a:fld>
             <a:endParaRPr lang="fr-FR"/>
           </a:p>
@@ -1243,7 +1243,7 @@
           <a:p>
             <a:fld id="{43AD7C33-C558-4392-912A-45ED6039CB4D}" type="datetimeFigureOut">
               <a:rPr lang="fr-FR" smtClean="0"/>
-              <a:t>03/08/2016</a:t>
+              <a:t>12/01/2017</a:t>
             </a:fld>
             <a:endParaRPr lang="fr-FR"/>
           </a:p>
@@ -1285,7 +1285,7 @@
           <a:p>
             <a:fld id="{76531600-BD36-44DA-BBB5-C06D17DDD171}" type="slidenum">
               <a:rPr lang="fr-FR" smtClean="0"/>
-              <a:t>‹N°›</a:t>
+              <a:t>‹#›</a:t>
             </a:fld>
             <a:endParaRPr lang="fr-FR"/>
           </a:p>
@@ -1610,7 +1610,7 @@
           <a:p>
             <a:fld id="{43AD7C33-C558-4392-912A-45ED6039CB4D}" type="datetimeFigureOut">
               <a:rPr lang="fr-FR" smtClean="0"/>
-              <a:t>03/08/2016</a:t>
+              <a:t>12/01/2017</a:t>
             </a:fld>
             <a:endParaRPr lang="fr-FR"/>
           </a:p>
@@ -1652,7 +1652,7 @@
           <a:p>
             <a:fld id="{76531600-BD36-44DA-BBB5-C06D17DDD171}" type="slidenum">
               <a:rPr lang="fr-FR" smtClean="0"/>
-              <a:t>‹N°›</a:t>
+              <a:t>‹#›</a:t>
             </a:fld>
             <a:endParaRPr lang="fr-FR"/>
           </a:p>
@@ -1728,7 +1728,7 @@
           <a:p>
             <a:fld id="{43AD7C33-C558-4392-912A-45ED6039CB4D}" type="datetimeFigureOut">
               <a:rPr lang="fr-FR" smtClean="0"/>
-              <a:t>03/08/2016</a:t>
+              <a:t>12/01/2017</a:t>
             </a:fld>
             <a:endParaRPr lang="fr-FR"/>
           </a:p>
@@ -1770,7 +1770,7 @@
           <a:p>
             <a:fld id="{76531600-BD36-44DA-BBB5-C06D17DDD171}" type="slidenum">
               <a:rPr lang="fr-FR" smtClean="0"/>
-              <a:t>‹N°›</a:t>
+              <a:t>‹#›</a:t>
             </a:fld>
             <a:endParaRPr lang="fr-FR"/>
           </a:p>
@@ -1823,7 +1823,7 @@
           <a:p>
             <a:fld id="{43AD7C33-C558-4392-912A-45ED6039CB4D}" type="datetimeFigureOut">
               <a:rPr lang="fr-FR" smtClean="0"/>
-              <a:t>03/08/2016</a:t>
+              <a:t>12/01/2017</a:t>
             </a:fld>
             <a:endParaRPr lang="fr-FR"/>
           </a:p>
@@ -1865,7 +1865,7 @@
           <a:p>
             <a:fld id="{76531600-BD36-44DA-BBB5-C06D17DDD171}" type="slidenum">
               <a:rPr lang="fr-FR" smtClean="0"/>
-              <a:t>‹N°›</a:t>
+              <a:t>‹#›</a:t>
             </a:fld>
             <a:endParaRPr lang="fr-FR"/>
           </a:p>
@@ -2100,7 +2100,7 @@
           <a:p>
             <a:fld id="{43AD7C33-C558-4392-912A-45ED6039CB4D}" type="datetimeFigureOut">
               <a:rPr lang="fr-FR" smtClean="0"/>
-              <a:t>03/08/2016</a:t>
+              <a:t>12/01/2017</a:t>
             </a:fld>
             <a:endParaRPr lang="fr-FR"/>
           </a:p>
@@ -2142,7 +2142,7 @@
           <a:p>
             <a:fld id="{76531600-BD36-44DA-BBB5-C06D17DDD171}" type="slidenum">
               <a:rPr lang="fr-FR" smtClean="0"/>
-              <a:t>‹N°›</a:t>
+              <a:t>‹#›</a:t>
             </a:fld>
             <a:endParaRPr lang="fr-FR"/>
           </a:p>
@@ -2353,7 +2353,7 @@
           <a:p>
             <a:fld id="{43AD7C33-C558-4392-912A-45ED6039CB4D}" type="datetimeFigureOut">
               <a:rPr lang="fr-FR" smtClean="0"/>
-              <a:t>03/08/2016</a:t>
+              <a:t>12/01/2017</a:t>
             </a:fld>
             <a:endParaRPr lang="fr-FR"/>
           </a:p>
@@ -2395,7 +2395,7 @@
           <a:p>
             <a:fld id="{76531600-BD36-44DA-BBB5-C06D17DDD171}" type="slidenum">
               <a:rPr lang="fr-FR" smtClean="0"/>
-              <a:t>‹N°›</a:t>
+              <a:t>‹#›</a:t>
             </a:fld>
             <a:endParaRPr lang="fr-FR"/>
           </a:p>
@@ -2566,7 +2566,7 @@
           <a:p>
             <a:fld id="{43AD7C33-C558-4392-912A-45ED6039CB4D}" type="datetimeFigureOut">
               <a:rPr lang="fr-FR" smtClean="0"/>
-              <a:t>03/08/2016</a:t>
+              <a:t>12/01/2017</a:t>
             </a:fld>
             <a:endParaRPr lang="fr-FR"/>
           </a:p>
@@ -2644,7 +2644,7 @@
           <a:p>
             <a:fld id="{76531600-BD36-44DA-BBB5-C06D17DDD171}" type="slidenum">
               <a:rPr lang="fr-FR" smtClean="0"/>
-              <a:t>‹N°›</a:t>
+              <a:t>‹#›</a:t>
             </a:fld>
             <a:endParaRPr lang="fr-FR"/>
           </a:p>
@@ -3085,11 +3085,7 @@
           <a:p>
             <a:r>
               <a:rPr lang="fr-FR" dirty="0" smtClean="0"/>
-              <a:t>Schéma </a:t>
-            </a:r>
-            <a:r>
-              <a:rPr lang="fr-FR" dirty="0" smtClean="0"/>
-              <a:t>blocs</a:t>
+              <a:t>Schéma blocs</a:t>
             </a:r>
           </a:p>
         </p:txBody>
@@ -3102,7 +3098,7 @@
         </p:nvSpPr>
         <p:spPr>
           <a:xfrm>
-            <a:off x="2277117" y="575515"/>
+            <a:off x="2269508" y="1238943"/>
             <a:ext cx="1087167" cy="1526876"/>
           </a:xfrm>
           <a:prstGeom prst="rect">
@@ -3149,7 +3145,7 @@
         </p:nvCxnSpPr>
         <p:spPr>
           <a:xfrm>
-            <a:off x="3364284" y="1338953"/>
+            <a:off x="3356675" y="2002381"/>
             <a:ext cx="0" cy="0"/>
           </a:xfrm>
           <a:prstGeom prst="straightConnector1">
@@ -3182,7 +3178,7 @@
         </p:nvGrpSpPr>
         <p:grpSpPr>
           <a:xfrm>
-            <a:off x="-27251" y="4736215"/>
+            <a:off x="1837" y="4711091"/>
             <a:ext cx="2003315" cy="1526876"/>
             <a:chOff x="-192978" y="4259006"/>
             <a:chExt cx="2003315" cy="1526876"/>
@@ -3393,11 +3389,6 @@
                 </a:rPr>
                 <a:t>(aux)</a:t>
               </a:r>
-              <a:endParaRPr lang="fr-FR" sz="800" dirty="0" smtClean="0">
-                <a:solidFill>
-                  <a:srgbClr val="00B050"/>
-                </a:solidFill>
-              </a:endParaRPr>
             </a:p>
           </p:txBody>
         </p:sp>
@@ -3410,7 +3401,7 @@
         </p:nvGrpSpPr>
         <p:grpSpPr>
           <a:xfrm>
-            <a:off x="-20768" y="575515"/>
+            <a:off x="1837" y="1238943"/>
             <a:ext cx="1996832" cy="1621118"/>
             <a:chOff x="-207248" y="2296105"/>
             <a:chExt cx="1996832" cy="1621118"/>
@@ -3726,11 +3717,6 @@
                 </a:rPr>
                 <a:t>)</a:t>
               </a:r>
-              <a:endParaRPr lang="fr-FR" sz="800" dirty="0" smtClean="0">
-                <a:solidFill>
-                  <a:srgbClr val="0070C0"/>
-                </a:solidFill>
-              </a:endParaRPr>
             </a:p>
           </p:txBody>
         </p:sp>
@@ -3871,7 +3857,7 @@
         </p:nvGrpSpPr>
         <p:grpSpPr>
           <a:xfrm>
-            <a:off x="-20768" y="2294061"/>
+            <a:off x="1837" y="2957489"/>
             <a:ext cx="1996832" cy="1526876"/>
             <a:chOff x="1466393" y="573044"/>
             <a:chExt cx="1996832" cy="1526876"/>
@@ -4037,11 +4023,6 @@
                   </a:rPr>
                   <a:t>)</a:t>
                 </a:r>
-                <a:endParaRPr lang="fr-FR" sz="800" dirty="0" smtClean="0">
-                  <a:solidFill>
-                    <a:srgbClr val="0070C0"/>
-                  </a:solidFill>
-                </a:endParaRPr>
               </a:p>
             </p:txBody>
           </p:sp>
@@ -4049,18 +4030,21 @@
       </p:grpSp>
       <p:sp>
         <p:nvSpPr>
-          <p:cNvPr id="48" name="Rectangle 47"/>
+          <p:cNvPr id="32" name="Rectangle 31"/>
           <p:cNvSpPr/>
           <p:nvPr/>
         </p:nvSpPr>
         <p:spPr>
           <a:xfrm>
-            <a:off x="3272957" y="2294061"/>
-            <a:ext cx="707366" cy="1526876"/>
+            <a:off x="9327278" y="3646660"/>
+            <a:ext cx="1057553" cy="1526876"/>
           </a:xfrm>
           <a:prstGeom prst="rect">
             <a:avLst/>
           </a:prstGeom>
+          <a:solidFill>
+            <a:srgbClr val="00B050"/>
+          </a:solidFill>
         </p:spPr>
         <p:style>
           <a:lnRef idx="2">
@@ -4085,310 +4069,8 @@
             <a:pPr algn="ctr"/>
             <a:r>
               <a:rPr lang="fr-FR" dirty="0" smtClean="0"/>
-              <a:t>I2S MUX</a:t>
-            </a:r>
-            <a:endParaRPr lang="fr-FR" dirty="0"/>
-          </a:p>
-        </p:txBody>
-      </p:sp>
-      <p:grpSp>
-        <p:nvGrpSpPr>
-          <p:cNvPr id="107" name="Groupe 106"/>
-          <p:cNvGrpSpPr/>
-          <p:nvPr/>
-        </p:nvGrpSpPr>
-        <p:grpSpPr>
-          <a:xfrm>
-            <a:off x="9327278" y="3091890"/>
-            <a:ext cx="2864721" cy="2081646"/>
-            <a:chOff x="6141125" y="3701210"/>
-            <a:chExt cx="2864721" cy="2081646"/>
-          </a:xfrm>
-        </p:grpSpPr>
-        <p:sp>
-          <p:nvSpPr>
-            <p:cNvPr id="32" name="Rectangle 31"/>
-            <p:cNvSpPr/>
-            <p:nvPr/>
-          </p:nvSpPr>
-          <p:spPr>
-            <a:xfrm>
-              <a:off x="6141125" y="4255980"/>
-              <a:ext cx="1057553" cy="1526876"/>
-            </a:xfrm>
-            <a:prstGeom prst="rect">
-              <a:avLst/>
-            </a:prstGeom>
-            <a:solidFill>
-              <a:srgbClr val="00B050"/>
-            </a:solidFill>
-          </p:spPr>
-          <p:style>
-            <a:lnRef idx="2">
-              <a:schemeClr val="accent1">
-                <a:shade val="50000"/>
-              </a:schemeClr>
-            </a:lnRef>
-            <a:fillRef idx="1">
-              <a:schemeClr val="accent1"/>
-            </a:fillRef>
-            <a:effectRef idx="0">
-              <a:schemeClr val="accent1"/>
-            </a:effectRef>
-            <a:fontRef idx="minor">
-              <a:schemeClr val="lt1"/>
-            </a:fontRef>
-          </p:style>
-          <p:txBody>
-            <a:bodyPr rtlCol="0" anchor="ctr"/>
-            <a:lstStyle/>
-            <a:p>
-              <a:pPr algn="ctr"/>
-              <a:r>
-                <a:rPr lang="fr-FR" dirty="0" smtClean="0"/>
-                <a:t>Contrôle de </a:t>
-              </a:r>
-              <a:r>
-                <a:rPr lang="fr-FR" dirty="0" smtClean="0"/>
-                <a:t>volume</a:t>
-              </a:r>
-            </a:p>
-          </p:txBody>
-        </p:sp>
-        <p:cxnSp>
-          <p:nvCxnSpPr>
-            <p:cNvPr id="90" name="Connecteur droit avec flèche 48"/>
-            <p:cNvCxnSpPr/>
-            <p:nvPr/>
-          </p:nvCxnSpPr>
-          <p:spPr>
-            <a:xfrm flipH="1">
-              <a:off x="7194913" y="3855724"/>
-              <a:ext cx="398117" cy="407036"/>
-            </a:xfrm>
-            <a:prstGeom prst="straightConnector1">
-              <a:avLst/>
-            </a:prstGeom>
-            <a:ln>
-              <a:tailEnd type="triangle"/>
-            </a:ln>
-          </p:spPr>
-          <p:style>
-            <a:lnRef idx="1">
-              <a:schemeClr val="accent1"/>
-            </a:lnRef>
-            <a:fillRef idx="0">
-              <a:schemeClr val="accent1"/>
-            </a:fillRef>
-            <a:effectRef idx="0">
-              <a:schemeClr val="accent1"/>
-            </a:effectRef>
-            <a:fontRef idx="minor">
-              <a:schemeClr val="tx1"/>
-            </a:fontRef>
-          </p:style>
-        </p:cxnSp>
-        <p:sp>
-          <p:nvSpPr>
-            <p:cNvPr id="92" name="ZoneTexte 40"/>
-            <p:cNvSpPr txBox="1"/>
-            <p:nvPr/>
-          </p:nvSpPr>
-          <p:spPr>
-            <a:xfrm>
-              <a:off x="7540841" y="3701210"/>
-              <a:ext cx="1465005" cy="523220"/>
-            </a:xfrm>
-            <a:prstGeom prst="rect">
-              <a:avLst/>
-            </a:prstGeom>
-            <a:noFill/>
-          </p:spPr>
-          <p:txBody>
-            <a:bodyPr wrap="square" rtlCol="0">
-              <a:spAutoFit/>
-            </a:bodyPr>
-            <a:lstStyle/>
-            <a:p>
-              <a:r>
-                <a:rPr lang="fr-FR" sz="1400" dirty="0" smtClean="0">
-                  <a:solidFill>
-                    <a:srgbClr val="0070C0"/>
-                  </a:solidFill>
-                </a:rPr>
-                <a:t>Réglage </a:t>
-              </a:r>
-              <a:r>
-                <a:rPr lang="fr-FR" sz="1400" dirty="0" smtClean="0">
-                  <a:solidFill>
-                    <a:srgbClr val="0070C0"/>
-                  </a:solidFill>
-                </a:rPr>
-                <a:t>de </a:t>
-              </a:r>
-              <a:r>
-                <a:rPr lang="fr-FR" sz="1400" dirty="0" smtClean="0">
-                  <a:solidFill>
-                    <a:srgbClr val="0070C0"/>
-                  </a:solidFill>
-                </a:rPr>
-                <a:t>Volume (14 pins)</a:t>
-              </a:r>
-              <a:endParaRPr lang="fr-FR" sz="1400" dirty="0">
-                <a:solidFill>
-                  <a:srgbClr val="0070C0"/>
-                </a:solidFill>
-              </a:endParaRPr>
-            </a:p>
-          </p:txBody>
-        </p:sp>
-      </p:grpSp>
-      <p:sp>
-        <p:nvSpPr>
-          <p:cNvPr id="94" name="ZoneTexte 40"/>
-          <p:cNvSpPr txBox="1"/>
-          <p:nvPr/>
-        </p:nvSpPr>
-        <p:spPr>
-          <a:xfrm>
-            <a:off x="4271971" y="2371035"/>
-            <a:ext cx="1763630" cy="523220"/>
-          </a:xfrm>
-          <a:prstGeom prst="rect">
-            <a:avLst/>
-          </a:prstGeom>
-          <a:noFill/>
-        </p:spPr>
-        <p:txBody>
-          <a:bodyPr wrap="square" rtlCol="0">
-            <a:spAutoFit/>
-          </a:bodyPr>
-          <a:lstStyle/>
-          <a:p>
-            <a:r>
-              <a:rPr lang="fr-FR" sz="1400" dirty="0" smtClean="0">
-                <a:solidFill>
-                  <a:srgbClr val="0070C0"/>
-                </a:solidFill>
-              </a:rPr>
-              <a:t>Select </a:t>
-            </a:r>
-            <a:r>
-              <a:rPr lang="fr-FR" sz="1400" dirty="0">
-                <a:solidFill>
-                  <a:srgbClr val="0070C0"/>
-                </a:solidFill>
-              </a:rPr>
-              <a:t>Digital / </a:t>
-            </a:r>
-            <a:r>
-              <a:rPr lang="fr-FR" sz="1400" dirty="0" err="1">
-                <a:solidFill>
-                  <a:srgbClr val="0070C0"/>
-                </a:solidFill>
-              </a:rPr>
-              <a:t>Analog</a:t>
-            </a:r>
-            <a:r>
-              <a:rPr lang="fr-FR" sz="1400" dirty="0">
-                <a:solidFill>
-                  <a:srgbClr val="0070C0"/>
-                </a:solidFill>
-              </a:rPr>
-              <a:t> </a:t>
-            </a:r>
-            <a:r>
-              <a:rPr lang="fr-FR" sz="1400" dirty="0" smtClean="0">
-                <a:solidFill>
-                  <a:srgbClr val="0070C0"/>
-                </a:solidFill>
-              </a:rPr>
-              <a:t>= A6 or A7.</a:t>
-            </a:r>
-            <a:endParaRPr lang="fr-FR" sz="1400" dirty="0">
-              <a:solidFill>
-                <a:srgbClr val="0070C0"/>
-              </a:solidFill>
-            </a:endParaRPr>
-          </a:p>
-        </p:txBody>
-      </p:sp>
-      <p:cxnSp>
-        <p:nvCxnSpPr>
-          <p:cNvPr id="95" name="Connecteur droit avec flèche 48"/>
-          <p:cNvCxnSpPr/>
-          <p:nvPr/>
-        </p:nvCxnSpPr>
-        <p:spPr>
-          <a:xfrm flipH="1">
-            <a:off x="3981388" y="1766336"/>
-            <a:ext cx="749410" cy="524044"/>
-          </a:xfrm>
-          <a:prstGeom prst="straightConnector1">
-            <a:avLst/>
-          </a:prstGeom>
-          <a:ln>
-            <a:tailEnd type="triangle"/>
-          </a:ln>
-        </p:spPr>
-        <p:style>
-          <a:lnRef idx="1">
-            <a:schemeClr val="accent1"/>
-          </a:lnRef>
-          <a:fillRef idx="0">
-            <a:schemeClr val="accent1"/>
-          </a:fillRef>
-          <a:effectRef idx="0">
-            <a:schemeClr val="accent1"/>
-          </a:effectRef>
-          <a:fontRef idx="minor">
-            <a:schemeClr val="tx1"/>
-          </a:fontRef>
-        </p:style>
-      </p:cxnSp>
-      <p:sp>
-        <p:nvSpPr>
-          <p:cNvPr id="96" name="ZoneTexte 40"/>
-          <p:cNvSpPr txBox="1"/>
-          <p:nvPr/>
-        </p:nvSpPr>
-        <p:spPr>
-          <a:xfrm>
-            <a:off x="4704705" y="1491034"/>
-            <a:ext cx="1330896" cy="523220"/>
-          </a:xfrm>
-          <a:prstGeom prst="rect">
-            <a:avLst/>
-          </a:prstGeom>
-          <a:noFill/>
-        </p:spPr>
-        <p:txBody>
-          <a:bodyPr wrap="square" rtlCol="0">
-            <a:spAutoFit/>
-          </a:bodyPr>
-          <a:lstStyle/>
-          <a:p>
-            <a:r>
-              <a:rPr lang="fr-FR" sz="1400" dirty="0" smtClean="0">
-                <a:solidFill>
-                  <a:srgbClr val="0070C0"/>
-                </a:solidFill>
-              </a:rPr>
-              <a:t>Select </a:t>
-            </a:r>
-            <a:r>
-              <a:rPr lang="fr-FR" sz="1400" dirty="0" smtClean="0">
-                <a:solidFill>
-                  <a:srgbClr val="0070C0"/>
-                </a:solidFill>
-              </a:rPr>
-              <a:t>SPDIF/USB = N5</a:t>
-            </a:r>
-            <a:endParaRPr lang="fr-FR" sz="1400" dirty="0">
-              <a:solidFill>
-                <a:srgbClr val="0070C0"/>
-              </a:solidFill>
-            </a:endParaRPr>
+              <a:t>Contrôle de volume</a:t>
+            </a:r>
           </a:p>
         </p:txBody>
       </p:sp>
@@ -4467,15 +4149,7 @@
                     <a:srgbClr val="0070C0"/>
                   </a:solidFill>
                 </a:rPr>
-                <a:t>Trigger </a:t>
-              </a:r>
-              <a:r>
-                <a:rPr lang="fr-FR" sz="1400" dirty="0" smtClean="0">
-                  <a:solidFill>
-                    <a:srgbClr val="0070C0"/>
-                  </a:solidFill>
-                </a:rPr>
-                <a:t>IN</a:t>
+                <a:t>Trigger IN</a:t>
               </a:r>
             </a:p>
           </p:txBody>
@@ -4618,17 +4292,17 @@
       </p:sp>
       <p:cxnSp>
         <p:nvCxnSpPr>
-          <p:cNvPr id="12" name="Connecteur droit avec flèche 11"/>
+          <p:cNvPr id="56" name="Connecteur droit avec flèche 55"/>
           <p:cNvCxnSpPr>
-            <a:stCxn id="17" idx="3"/>
-            <a:endCxn id="48" idx="1"/>
+            <a:stCxn id="19" idx="3"/>
+            <a:endCxn id="15" idx="1"/>
           </p:cNvCxnSpPr>
           <p:nvPr/>
         </p:nvCxnSpPr>
         <p:spPr>
           <a:xfrm>
-            <a:off x="1976064" y="3057499"/>
-            <a:ext cx="1296893" cy="0"/>
+            <a:off x="1998669" y="2002381"/>
+            <a:ext cx="270839" cy="0"/>
           </a:xfrm>
           <a:prstGeom prst="straightConnector1">
             <a:avLst/>
@@ -4652,78 +4326,6 @@
           </a:fontRef>
         </p:style>
       </p:cxnSp>
-      <p:cxnSp>
-        <p:nvCxnSpPr>
-          <p:cNvPr id="37" name="Connecteur en angle 36"/>
-          <p:cNvCxnSpPr>
-            <a:stCxn id="15" idx="3"/>
-            <a:endCxn id="48" idx="0"/>
-          </p:cNvCxnSpPr>
-          <p:nvPr/>
-        </p:nvCxnSpPr>
-        <p:spPr>
-          <a:xfrm>
-            <a:off x="3364284" y="1338953"/>
-            <a:ext cx="262356" cy="955108"/>
-          </a:xfrm>
-          <a:prstGeom prst="bentConnector2">
-            <a:avLst/>
-          </a:prstGeom>
-          <a:ln>
-            <a:tailEnd type="triangle"/>
-          </a:ln>
-        </p:spPr>
-        <p:style>
-          <a:lnRef idx="1">
-            <a:schemeClr val="accent1"/>
-          </a:lnRef>
-          <a:fillRef idx="0">
-            <a:schemeClr val="accent1"/>
-          </a:fillRef>
-          <a:effectRef idx="0">
-            <a:schemeClr val="accent1"/>
-          </a:effectRef>
-          <a:fontRef idx="minor">
-            <a:schemeClr val="tx1"/>
-          </a:fontRef>
-        </p:style>
-      </p:cxnSp>
-      <p:cxnSp>
-        <p:nvCxnSpPr>
-          <p:cNvPr id="56" name="Connecteur droit avec flèche 55"/>
-          <p:cNvCxnSpPr>
-            <a:stCxn id="19" idx="3"/>
-            <a:endCxn id="15" idx="1"/>
-          </p:cNvCxnSpPr>
-          <p:nvPr/>
-        </p:nvCxnSpPr>
-        <p:spPr>
-          <a:xfrm>
-            <a:off x="1976064" y="1338953"/>
-            <a:ext cx="301053" cy="0"/>
-          </a:xfrm>
-          <a:prstGeom prst="straightConnector1">
-            <a:avLst/>
-          </a:prstGeom>
-          <a:ln>
-            <a:tailEnd type="triangle"/>
-          </a:ln>
-        </p:spPr>
-        <p:style>
-          <a:lnRef idx="1">
-            <a:schemeClr val="accent1"/>
-          </a:lnRef>
-          <a:fillRef idx="0">
-            <a:schemeClr val="accent1"/>
-          </a:fillRef>
-          <a:effectRef idx="0">
-            <a:schemeClr val="accent1"/>
-          </a:effectRef>
-          <a:fontRef idx="minor">
-            <a:schemeClr val="tx1"/>
-          </a:fontRef>
-        </p:style>
-      </p:cxnSp>
       <p:sp>
         <p:nvSpPr>
           <p:cNvPr id="108" name="Rectangle 107"/>
@@ -4732,7 +4334,7 @@
         </p:nvSpPr>
         <p:spPr>
           <a:xfrm>
-            <a:off x="2277212" y="4736215"/>
+            <a:off x="2306300" y="4711091"/>
             <a:ext cx="935966" cy="1526876"/>
           </a:xfrm>
           <a:prstGeom prst="rect">
@@ -4790,6 +4392,13 @@
             <a:r>
               <a:rPr lang="fr-FR" dirty="0" smtClean="0"/>
               <a:t>ADC</a:t>
+            </a:r>
+          </a:p>
+          <a:p>
+            <a:pPr algn="ctr"/>
+            <a:r>
+              <a:rPr lang="fr-FR" dirty="0" smtClean="0"/>
+              <a:t>24/192</a:t>
             </a:r>
             <a:endParaRPr lang="fr-FR" dirty="0"/>
           </a:p>
@@ -4981,8 +4590,8 @@
         </p:nvSpPr>
         <p:spPr>
           <a:xfrm>
-            <a:off x="4209937" y="3656436"/>
-            <a:ext cx="707366" cy="1526876"/>
+            <a:off x="5070722" y="2294061"/>
+            <a:ext cx="1234446" cy="1526876"/>
           </a:xfrm>
           <a:prstGeom prst="rect">
             <a:avLst/>
@@ -5010,49 +4619,31 @@
           <a:p>
             <a:pPr algn="ctr"/>
             <a:r>
+              <a:rPr lang="fr-FR" dirty="0" err="1" smtClean="0"/>
+              <a:t>miniDSP</a:t>
+            </a:r>
+            <a:endParaRPr lang="fr-FR" dirty="0" smtClean="0"/>
+          </a:p>
+          <a:p>
+            <a:pPr algn="ctr"/>
+            <a:r>
               <a:rPr lang="fr-FR" dirty="0" smtClean="0"/>
-              <a:t>I2S MUX</a:t>
+              <a:t>I2S </a:t>
+            </a:r>
+            <a:r>
+              <a:rPr lang="fr-FR" dirty="0" smtClean="0">
+                <a:sym typeface="Wingdings" panose="05000000000000000000" pitchFamily="2" charset="2"/>
+              </a:rPr>
+              <a:t></a:t>
+            </a:r>
+            <a:r>
+              <a:rPr lang="fr-FR" dirty="0" smtClean="0"/>
+              <a:t> USB</a:t>
             </a:r>
             <a:endParaRPr lang="fr-FR" dirty="0"/>
           </a:p>
         </p:txBody>
       </p:sp>
-      <p:cxnSp>
-        <p:nvCxnSpPr>
-          <p:cNvPr id="129" name="Connecteur en angle 128"/>
-          <p:cNvCxnSpPr>
-            <a:stCxn id="48" idx="3"/>
-            <a:endCxn id="127" idx="0"/>
-          </p:cNvCxnSpPr>
-          <p:nvPr/>
-        </p:nvCxnSpPr>
-        <p:spPr>
-          <a:xfrm>
-            <a:off x="3980323" y="3057499"/>
-            <a:ext cx="583297" cy="598937"/>
-          </a:xfrm>
-          <a:prstGeom prst="bentConnector2">
-            <a:avLst/>
-          </a:prstGeom>
-          <a:ln>
-            <a:tailEnd type="triangle"/>
-          </a:ln>
-        </p:spPr>
-        <p:style>
-          <a:lnRef idx="1">
-            <a:schemeClr val="accent1"/>
-          </a:lnRef>
-          <a:fillRef idx="0">
-            <a:schemeClr val="accent1"/>
-          </a:fillRef>
-          <a:effectRef idx="0">
-            <a:schemeClr val="accent1"/>
-          </a:effectRef>
-          <a:fontRef idx="minor">
-            <a:schemeClr val="tx1"/>
-          </a:fontRef>
-        </p:style>
-      </p:cxnSp>
       <p:sp>
         <p:nvSpPr>
           <p:cNvPr id="132" name="Rectangle 131"/>
@@ -5061,8 +4652,8 @@
         </p:nvSpPr>
         <p:spPr>
           <a:xfrm>
-            <a:off x="5153025" y="3225503"/>
-            <a:ext cx="2166776" cy="2382750"/>
+            <a:off x="4654887" y="4604644"/>
+            <a:ext cx="2054176" cy="2203077"/>
           </a:xfrm>
           <a:prstGeom prst="rect">
             <a:avLst/>
@@ -5090,9 +4681,22 @@
           <a:p>
             <a:pPr algn="ctr"/>
             <a:r>
+              <a:rPr lang="fr-FR" dirty="0" err="1" smtClean="0"/>
+              <a:t>MinnowBoard</a:t>
+            </a:r>
+            <a:r>
               <a:rPr lang="fr-FR" dirty="0" smtClean="0"/>
-              <a:t>DSP</a:t>
-            </a:r>
+              <a:t> avec Ubuntu Server utilisant </a:t>
+            </a:r>
+            <a:r>
+              <a:rPr lang="fr-FR" dirty="0" err="1" smtClean="0"/>
+              <a:t>Brutefir</a:t>
+            </a:r>
+            <a:r>
+              <a:rPr lang="fr-FR" dirty="0" smtClean="0"/>
+              <a:t>.</a:t>
+            </a:r>
+            <a:endParaRPr lang="fr-FR" dirty="0" smtClean="0"/>
           </a:p>
           <a:p>
             <a:pPr algn="ctr"/>
@@ -5131,150 +4735,6 @@
           </a:p>
         </p:txBody>
       </p:sp>
-      <p:cxnSp>
-        <p:nvCxnSpPr>
-          <p:cNvPr id="134" name="Connecteur droit avec flèche 133"/>
-          <p:cNvCxnSpPr>
-            <a:stCxn id="127" idx="3"/>
-            <a:endCxn id="132" idx="1"/>
-          </p:cNvCxnSpPr>
-          <p:nvPr/>
-        </p:nvCxnSpPr>
-        <p:spPr>
-          <a:xfrm flipV="1">
-            <a:off x="4917303" y="4416878"/>
-            <a:ext cx="235722" cy="2996"/>
-          </a:xfrm>
-          <a:prstGeom prst="straightConnector1">
-            <a:avLst/>
-          </a:prstGeom>
-          <a:ln>
-            <a:tailEnd type="triangle"/>
-          </a:ln>
-        </p:spPr>
-        <p:style>
-          <a:lnRef idx="1">
-            <a:schemeClr val="accent1"/>
-          </a:lnRef>
-          <a:fillRef idx="0">
-            <a:schemeClr val="accent1"/>
-          </a:fillRef>
-          <a:effectRef idx="0">
-            <a:schemeClr val="accent1"/>
-          </a:effectRef>
-          <a:fontRef idx="minor">
-            <a:schemeClr val="tx1"/>
-          </a:fontRef>
-        </p:style>
-      </p:cxnSp>
-      <p:cxnSp>
-        <p:nvCxnSpPr>
-          <p:cNvPr id="139" name="Connecteur droit avec flèche 138"/>
-          <p:cNvCxnSpPr>
-            <a:stCxn id="132" idx="3"/>
-            <a:endCxn id="110" idx="1"/>
-          </p:cNvCxnSpPr>
-          <p:nvPr/>
-        </p:nvCxnSpPr>
-        <p:spPr>
-          <a:xfrm>
-            <a:off x="7319801" y="4416878"/>
-            <a:ext cx="231323" cy="0"/>
-          </a:xfrm>
-          <a:prstGeom prst="straightConnector1">
-            <a:avLst/>
-          </a:prstGeom>
-          <a:ln>
-            <a:tailEnd type="triangle"/>
-          </a:ln>
-        </p:spPr>
-        <p:style>
-          <a:lnRef idx="1">
-            <a:schemeClr val="accent1"/>
-          </a:lnRef>
-          <a:fillRef idx="0">
-            <a:schemeClr val="accent1"/>
-          </a:fillRef>
-          <a:effectRef idx="0">
-            <a:schemeClr val="accent1"/>
-          </a:effectRef>
-          <a:fontRef idx="minor">
-            <a:schemeClr val="tx1"/>
-          </a:fontRef>
-        </p:style>
-      </p:cxnSp>
-      <p:cxnSp>
-        <p:nvCxnSpPr>
-          <p:cNvPr id="145" name="Connecteur en angle 144"/>
-          <p:cNvCxnSpPr>
-            <a:stCxn id="132" idx="0"/>
-            <a:endCxn id="20" idx="1"/>
-          </p:cNvCxnSpPr>
-          <p:nvPr/>
-        </p:nvCxnSpPr>
-        <p:spPr>
-          <a:xfrm rot="5400000" flipH="1" flipV="1">
-            <a:off x="6676915" y="2351295"/>
-            <a:ext cx="433707" cy="1314711"/>
-          </a:xfrm>
-          <a:prstGeom prst="bentConnector2">
-            <a:avLst/>
-          </a:prstGeom>
-          <a:ln>
-            <a:tailEnd type="triangle"/>
-          </a:ln>
-        </p:spPr>
-        <p:style>
-          <a:lnRef idx="1">
-            <a:schemeClr val="accent1"/>
-          </a:lnRef>
-          <a:fillRef idx="0">
-            <a:schemeClr val="accent1"/>
-          </a:fillRef>
-          <a:effectRef idx="0">
-            <a:schemeClr val="accent1"/>
-          </a:effectRef>
-          <a:fontRef idx="minor">
-            <a:schemeClr val="tx1"/>
-          </a:fontRef>
-        </p:style>
-      </p:cxnSp>
-      <p:cxnSp>
-        <p:nvCxnSpPr>
-          <p:cNvPr id="147" name="Connecteur en angle 146"/>
-          <p:cNvCxnSpPr>
-            <a:stCxn id="132" idx="2"/>
-            <a:endCxn id="111" idx="1"/>
-          </p:cNvCxnSpPr>
-          <p:nvPr/>
-        </p:nvCxnSpPr>
-        <p:spPr>
-          <a:xfrm rot="16200000" flipH="1">
-            <a:off x="6676700" y="5167966"/>
-            <a:ext cx="436030" cy="1316604"/>
-          </a:xfrm>
-          <a:prstGeom prst="bentConnector2">
-            <a:avLst/>
-          </a:prstGeom>
-          <a:ln>
-            <a:tailEnd type="triangle"/>
-          </a:ln>
-        </p:spPr>
-        <p:style>
-          <a:lnRef idx="1">
-            <a:schemeClr val="accent1"/>
-          </a:lnRef>
-          <a:fillRef idx="0">
-            <a:schemeClr val="accent1"/>
-          </a:fillRef>
-          <a:effectRef idx="0">
-            <a:schemeClr val="accent1"/>
-          </a:effectRef>
-          <a:fontRef idx="minor">
-            <a:schemeClr val="tx1"/>
-          </a:fontRef>
-        </p:style>
-      </p:cxnSp>
       <p:cxnSp>
         <p:nvCxnSpPr>
           <p:cNvPr id="150" name="Connecteur droit avec flèche 149"/>
@@ -5286,7 +4746,7 @@
         </p:nvCxnSpPr>
         <p:spPr>
           <a:xfrm>
-            <a:off x="1976064" y="5499653"/>
+            <a:off x="2005152" y="5474529"/>
             <a:ext cx="301148" cy="0"/>
           </a:xfrm>
           <a:prstGeom prst="straightConnector1">
@@ -5311,39 +4771,6 @@
           </a:fontRef>
         </p:style>
       </p:cxnSp>
-      <p:cxnSp>
-        <p:nvCxnSpPr>
-          <p:cNvPr id="151" name="Connecteur droit avec flèche 48"/>
-          <p:cNvCxnSpPr/>
-          <p:nvPr/>
-        </p:nvCxnSpPr>
-        <p:spPr>
-          <a:xfrm>
-            <a:off x="4909900" y="2831367"/>
-            <a:ext cx="6390" cy="783743"/>
-          </a:xfrm>
-          <a:prstGeom prst="straightConnector1">
-            <a:avLst/>
-          </a:prstGeom>
-          <a:ln>
-            <a:tailEnd type="triangle"/>
-          </a:ln>
-        </p:spPr>
-        <p:style>
-          <a:lnRef idx="1">
-            <a:schemeClr val="accent1"/>
-          </a:lnRef>
-          <a:fillRef idx="0">
-            <a:schemeClr val="accent1"/>
-          </a:fillRef>
-          <a:effectRef idx="0">
-            <a:schemeClr val="accent1"/>
-          </a:effectRef>
-          <a:fontRef idx="minor">
-            <a:schemeClr val="tx1"/>
-          </a:fontRef>
-        </p:style>
-      </p:cxnSp>
       <p:sp>
         <p:nvSpPr>
           <p:cNvPr id="154" name="ZoneTexte 36"/>
@@ -5496,42 +4923,6 @@
           </a:p>
         </p:txBody>
       </p:sp>
-      <p:cxnSp>
-        <p:nvCxnSpPr>
-          <p:cNvPr id="180" name="Connecteur en angle 179"/>
-          <p:cNvCxnSpPr>
-            <a:stCxn id="108" idx="3"/>
-            <a:endCxn id="127" idx="2"/>
-          </p:cNvCxnSpPr>
-          <p:nvPr/>
-        </p:nvCxnSpPr>
-        <p:spPr>
-          <a:xfrm flipV="1">
-            <a:off x="3213178" y="5183312"/>
-            <a:ext cx="1350442" cy="316341"/>
-          </a:xfrm>
-          <a:prstGeom prst="bentConnector2">
-            <a:avLst/>
-          </a:prstGeom>
-          <a:ln>
-            <a:tailEnd type="triangle"/>
-          </a:ln>
-        </p:spPr>
-        <p:style>
-          <a:lnRef idx="1">
-            <a:schemeClr val="accent1"/>
-          </a:lnRef>
-          <a:fillRef idx="0">
-            <a:schemeClr val="accent1"/>
-          </a:fillRef>
-          <a:effectRef idx="0">
-            <a:schemeClr val="accent1"/>
-          </a:effectRef>
-          <a:fontRef idx="minor">
-            <a:schemeClr val="tx1"/>
-          </a:fontRef>
-        </p:style>
-      </p:cxnSp>
       <p:sp>
         <p:nvSpPr>
           <p:cNvPr id="181" name="Rectangle 180"/>
@@ -5573,11 +4964,7 @@
             <a:pPr algn="ctr"/>
             <a:r>
               <a:rPr lang="fr-FR" dirty="0" smtClean="0"/>
-              <a:t>Contrôle de </a:t>
-            </a:r>
-            <a:r>
-              <a:rPr lang="fr-FR" dirty="0" smtClean="0"/>
-              <a:t>volume</a:t>
+              <a:t>Contrôle de volume</a:t>
             </a:r>
           </a:p>
         </p:txBody>
@@ -5623,11 +5010,7 @@
             <a:pPr algn="ctr"/>
             <a:r>
               <a:rPr lang="fr-FR" dirty="0" smtClean="0"/>
-              <a:t>Contrôle de </a:t>
-            </a:r>
-            <a:r>
-              <a:rPr lang="fr-FR" dirty="0" smtClean="0"/>
-              <a:t>volume</a:t>
+              <a:t>Contrôle de volume</a:t>
             </a:r>
           </a:p>
         </p:txBody>
@@ -5780,72 +5163,6 @@
           </a:p>
         </p:txBody>
       </p:sp>
-      <p:cxnSp>
-        <p:nvCxnSpPr>
-          <p:cNvPr id="194" name="Connecteur droit avec flèche 48"/>
-          <p:cNvCxnSpPr/>
-          <p:nvPr/>
-        </p:nvCxnSpPr>
-        <p:spPr>
-          <a:xfrm flipH="1" flipV="1">
-            <a:off x="10388597" y="2027173"/>
-            <a:ext cx="373186" cy="1205781"/>
-          </a:xfrm>
-          <a:prstGeom prst="straightConnector1">
-            <a:avLst/>
-          </a:prstGeom>
-          <a:ln>
-            <a:tailEnd type="triangle"/>
-          </a:ln>
-        </p:spPr>
-        <p:style>
-          <a:lnRef idx="1">
-            <a:schemeClr val="accent1"/>
-          </a:lnRef>
-          <a:fillRef idx="0">
-            <a:schemeClr val="accent1"/>
-          </a:fillRef>
-          <a:effectRef idx="0">
-            <a:schemeClr val="accent1"/>
-          </a:effectRef>
-          <a:fontRef idx="minor">
-            <a:schemeClr val="tx1"/>
-          </a:fontRef>
-        </p:style>
-      </p:cxnSp>
-      <p:cxnSp>
-        <p:nvCxnSpPr>
-          <p:cNvPr id="196" name="Connecteur droit avec flèche 48"/>
-          <p:cNvCxnSpPr/>
-          <p:nvPr/>
-        </p:nvCxnSpPr>
-        <p:spPr>
-          <a:xfrm flipH="1">
-            <a:off x="10393388" y="3232954"/>
-            <a:ext cx="385796" cy="2047891"/>
-          </a:xfrm>
-          <a:prstGeom prst="straightConnector1">
-            <a:avLst/>
-          </a:prstGeom>
-          <a:ln>
-            <a:tailEnd type="triangle"/>
-          </a:ln>
-        </p:spPr>
-        <p:style>
-          <a:lnRef idx="1">
-            <a:schemeClr val="accent1"/>
-          </a:lnRef>
-          <a:fillRef idx="0">
-            <a:schemeClr val="accent1"/>
-          </a:fillRef>
-          <a:effectRef idx="0">
-            <a:schemeClr val="accent1"/>
-          </a:effectRef>
-          <a:fontRef idx="minor">
-            <a:schemeClr val="tx1"/>
-          </a:fontRef>
-        </p:style>
-      </p:cxnSp>
       <p:cxnSp>
         <p:nvCxnSpPr>
           <p:cNvPr id="201" name="Connecteur droit avec flèche 200"/>
@@ -5931,6 +5248,475 @@
           <a:xfrm>
             <a:off x="8488983" y="6044283"/>
             <a:ext cx="842061" cy="0"/>
+          </a:xfrm>
+          <a:prstGeom prst="straightConnector1">
+            <a:avLst/>
+          </a:prstGeom>
+          <a:ln>
+            <a:tailEnd type="triangle"/>
+          </a:ln>
+        </p:spPr>
+        <p:style>
+          <a:lnRef idx="1">
+            <a:schemeClr val="accent1"/>
+          </a:lnRef>
+          <a:fillRef idx="0">
+            <a:schemeClr val="accent1"/>
+          </a:fillRef>
+          <a:effectRef idx="0">
+            <a:schemeClr val="accent1"/>
+          </a:effectRef>
+          <a:fontRef idx="minor">
+            <a:schemeClr val="tx1"/>
+          </a:fontRef>
+        </p:style>
+      </p:cxnSp>
+      <p:cxnSp>
+        <p:nvCxnSpPr>
+          <p:cNvPr id="58" name="Straight Arrow Connector 57"/>
+          <p:cNvCxnSpPr>
+            <a:endCxn id="20" idx="1"/>
+          </p:cNvCxnSpPr>
+          <p:nvPr/>
+        </p:nvCxnSpPr>
+        <p:spPr>
+          <a:xfrm flipV="1">
+            <a:off x="6327502" y="2791796"/>
+            <a:ext cx="1223622" cy="51009"/>
+          </a:xfrm>
+          <a:prstGeom prst="straightConnector1">
+            <a:avLst/>
+          </a:prstGeom>
+          <a:ln>
+            <a:tailEnd type="triangle"/>
+          </a:ln>
+        </p:spPr>
+        <p:style>
+          <a:lnRef idx="1">
+            <a:schemeClr val="accent1"/>
+          </a:lnRef>
+          <a:fillRef idx="0">
+            <a:schemeClr val="accent1"/>
+          </a:fillRef>
+          <a:effectRef idx="0">
+            <a:schemeClr val="accent1"/>
+          </a:effectRef>
+          <a:fontRef idx="minor">
+            <a:schemeClr val="tx1"/>
+          </a:fontRef>
+        </p:style>
+      </p:cxnSp>
+      <p:cxnSp>
+        <p:nvCxnSpPr>
+          <p:cNvPr id="60" name="Straight Arrow Connector 59"/>
+          <p:cNvCxnSpPr>
+            <a:stCxn id="127" idx="3"/>
+            <a:endCxn id="110" idx="1"/>
+          </p:cNvCxnSpPr>
+          <p:nvPr/>
+        </p:nvCxnSpPr>
+        <p:spPr>
+          <a:xfrm>
+            <a:off x="6305168" y="3057499"/>
+            <a:ext cx="1245956" cy="1359379"/>
+          </a:xfrm>
+          <a:prstGeom prst="straightConnector1">
+            <a:avLst/>
+          </a:prstGeom>
+          <a:ln>
+            <a:tailEnd type="triangle"/>
+          </a:ln>
+        </p:spPr>
+        <p:style>
+          <a:lnRef idx="1">
+            <a:schemeClr val="accent1"/>
+          </a:lnRef>
+          <a:fillRef idx="0">
+            <a:schemeClr val="accent1"/>
+          </a:fillRef>
+          <a:effectRef idx="0">
+            <a:schemeClr val="accent1"/>
+          </a:effectRef>
+          <a:fontRef idx="minor">
+            <a:schemeClr val="tx1"/>
+          </a:fontRef>
+        </p:style>
+      </p:cxnSp>
+      <p:cxnSp>
+        <p:nvCxnSpPr>
+          <p:cNvPr id="62" name="Straight Arrow Connector 61"/>
+          <p:cNvCxnSpPr>
+            <a:endCxn id="111" idx="1"/>
+          </p:cNvCxnSpPr>
+          <p:nvPr/>
+        </p:nvCxnSpPr>
+        <p:spPr>
+          <a:xfrm>
+            <a:off x="6327502" y="3395830"/>
+            <a:ext cx="1225515" cy="2648453"/>
+          </a:xfrm>
+          <a:prstGeom prst="straightConnector1">
+            <a:avLst/>
+          </a:prstGeom>
+          <a:ln>
+            <a:tailEnd type="triangle"/>
+          </a:ln>
+        </p:spPr>
+        <p:style>
+          <a:lnRef idx="1">
+            <a:schemeClr val="accent1"/>
+          </a:lnRef>
+          <a:fillRef idx="0">
+            <a:schemeClr val="accent1"/>
+          </a:fillRef>
+          <a:effectRef idx="0">
+            <a:schemeClr val="accent1"/>
+          </a:effectRef>
+          <a:fontRef idx="minor">
+            <a:schemeClr val="tx1"/>
+          </a:fontRef>
+        </p:style>
+      </p:cxnSp>
+      <p:cxnSp>
+        <p:nvCxnSpPr>
+          <p:cNvPr id="66" name="Straight Arrow Connector 65"/>
+          <p:cNvCxnSpPr>
+            <a:stCxn id="127" idx="2"/>
+            <a:endCxn id="132" idx="0"/>
+          </p:cNvCxnSpPr>
+          <p:nvPr/>
+        </p:nvCxnSpPr>
+        <p:spPr>
+          <a:xfrm flipH="1">
+            <a:off x="5681975" y="3820937"/>
+            <a:ext cx="5970" cy="783707"/>
+          </a:xfrm>
+          <a:prstGeom prst="straightConnector1">
+            <a:avLst/>
+          </a:prstGeom>
+          <a:ln>
+            <a:headEnd type="triangle"/>
+            <a:tailEnd type="triangle"/>
+          </a:ln>
+        </p:spPr>
+        <p:style>
+          <a:lnRef idx="1">
+            <a:schemeClr val="accent1"/>
+          </a:lnRef>
+          <a:fillRef idx="0">
+            <a:schemeClr val="accent1"/>
+          </a:fillRef>
+          <a:effectRef idx="0">
+            <a:schemeClr val="accent1"/>
+          </a:effectRef>
+          <a:fontRef idx="minor">
+            <a:schemeClr val="tx1"/>
+          </a:fontRef>
+        </p:style>
+      </p:cxnSp>
+      <p:sp>
+        <p:nvSpPr>
+          <p:cNvPr id="113" name="ZoneTexte 41"/>
+          <p:cNvSpPr txBox="1"/>
+          <p:nvPr/>
+        </p:nvSpPr>
+        <p:spPr>
+          <a:xfrm>
+            <a:off x="5308135" y="4073653"/>
+            <a:ext cx="603881" cy="276999"/>
+          </a:xfrm>
+          <a:prstGeom prst="rect">
+            <a:avLst/>
+          </a:prstGeom>
+          <a:noFill/>
+        </p:spPr>
+        <p:txBody>
+          <a:bodyPr wrap="square" rtlCol="0">
+            <a:spAutoFit/>
+          </a:bodyPr>
+          <a:lstStyle/>
+          <a:p>
+            <a:r>
+              <a:rPr lang="fr-FR" sz="1200" dirty="0" err="1" smtClean="0">
+                <a:solidFill>
+                  <a:srgbClr val="0070C0"/>
+                </a:solidFill>
+              </a:rPr>
+              <a:t>usb</a:t>
+            </a:r>
+            <a:endParaRPr lang="fr-FR" sz="1200" dirty="0" smtClean="0">
+              <a:solidFill>
+                <a:srgbClr val="0070C0"/>
+              </a:solidFill>
+            </a:endParaRPr>
+          </a:p>
+        </p:txBody>
+      </p:sp>
+      <p:sp>
+        <p:nvSpPr>
+          <p:cNvPr id="116" name="Rectangle 115"/>
+          <p:cNvSpPr/>
+          <p:nvPr/>
+        </p:nvSpPr>
+        <p:spPr>
+          <a:xfrm>
+            <a:off x="3631186" y="1238943"/>
+            <a:ext cx="1087167" cy="1526876"/>
+          </a:xfrm>
+          <a:prstGeom prst="rect">
+            <a:avLst/>
+          </a:prstGeom>
+        </p:spPr>
+        <p:style>
+          <a:lnRef idx="2">
+            <a:schemeClr val="accent1">
+              <a:shade val="50000"/>
+            </a:schemeClr>
+          </a:lnRef>
+          <a:fillRef idx="1">
+            <a:schemeClr val="accent1"/>
+          </a:fillRef>
+          <a:effectRef idx="0">
+            <a:schemeClr val="accent1"/>
+          </a:effectRef>
+          <a:fontRef idx="minor">
+            <a:schemeClr val="lt1"/>
+          </a:fontRef>
+        </p:style>
+        <p:txBody>
+          <a:bodyPr rtlCol="0" anchor="ctr"/>
+          <a:lstStyle/>
+          <a:p>
+            <a:pPr algn="ctr"/>
+            <a:r>
+              <a:rPr lang="fr-FR" sz="1600" dirty="0" err="1" smtClean="0"/>
+              <a:t>ReSampler</a:t>
+            </a:r>
+            <a:endParaRPr lang="fr-FR" sz="1600" dirty="0" smtClean="0"/>
+          </a:p>
+          <a:p>
+            <a:pPr algn="ctr"/>
+            <a:r>
+              <a:rPr lang="fr-FR" dirty="0" smtClean="0"/>
+              <a:t>=&gt;</a:t>
+            </a:r>
+            <a:r>
+              <a:rPr lang="fr-FR" dirty="0" smtClean="0"/>
+              <a:t> 24/192</a:t>
+            </a:r>
+            <a:endParaRPr lang="fr-FR" dirty="0"/>
+          </a:p>
+        </p:txBody>
+      </p:sp>
+      <p:sp>
+        <p:nvSpPr>
+          <p:cNvPr id="117" name="Rectangle 116"/>
+          <p:cNvSpPr/>
+          <p:nvPr/>
+        </p:nvSpPr>
+        <p:spPr>
+          <a:xfrm>
+            <a:off x="2950541" y="2957489"/>
+            <a:ext cx="1087167" cy="1526876"/>
+          </a:xfrm>
+          <a:prstGeom prst="rect">
+            <a:avLst/>
+          </a:prstGeom>
+        </p:spPr>
+        <p:style>
+          <a:lnRef idx="2">
+            <a:schemeClr val="accent1">
+              <a:shade val="50000"/>
+            </a:schemeClr>
+          </a:lnRef>
+          <a:fillRef idx="1">
+            <a:schemeClr val="accent1"/>
+          </a:fillRef>
+          <a:effectRef idx="0">
+            <a:schemeClr val="accent1"/>
+          </a:effectRef>
+          <a:fontRef idx="minor">
+            <a:schemeClr val="lt1"/>
+          </a:fontRef>
+        </p:style>
+        <p:txBody>
+          <a:bodyPr rtlCol="0" anchor="ctr"/>
+          <a:lstStyle/>
+          <a:p>
+            <a:pPr algn="ctr"/>
+            <a:r>
+              <a:rPr lang="fr-FR" sz="1600" dirty="0" err="1" smtClean="0"/>
+              <a:t>ReSampler</a:t>
+            </a:r>
+            <a:endParaRPr lang="fr-FR" sz="1600" dirty="0" smtClean="0"/>
+          </a:p>
+          <a:p>
+            <a:pPr algn="ctr"/>
+            <a:r>
+              <a:rPr lang="fr-FR" dirty="0" smtClean="0"/>
+              <a:t>=&gt;</a:t>
+            </a:r>
+            <a:r>
+              <a:rPr lang="fr-FR" dirty="0" smtClean="0"/>
+              <a:t> 24/192</a:t>
+            </a:r>
+            <a:endParaRPr lang="fr-FR" dirty="0"/>
+          </a:p>
+        </p:txBody>
+      </p:sp>
+      <p:cxnSp>
+        <p:nvCxnSpPr>
+          <p:cNvPr id="73" name="Straight Arrow Connector 72"/>
+          <p:cNvCxnSpPr>
+            <a:stCxn id="17" idx="3"/>
+            <a:endCxn id="117" idx="1"/>
+          </p:cNvCxnSpPr>
+          <p:nvPr/>
+        </p:nvCxnSpPr>
+        <p:spPr>
+          <a:xfrm>
+            <a:off x="1998669" y="3720927"/>
+            <a:ext cx="951872" cy="0"/>
+          </a:xfrm>
+          <a:prstGeom prst="straightConnector1">
+            <a:avLst/>
+          </a:prstGeom>
+          <a:ln>
+            <a:tailEnd type="triangle"/>
+          </a:ln>
+        </p:spPr>
+        <p:style>
+          <a:lnRef idx="1">
+            <a:schemeClr val="accent1"/>
+          </a:lnRef>
+          <a:fillRef idx="0">
+            <a:schemeClr val="accent1"/>
+          </a:fillRef>
+          <a:effectRef idx="0">
+            <a:schemeClr val="accent1"/>
+          </a:effectRef>
+          <a:fontRef idx="minor">
+            <a:schemeClr val="tx1"/>
+          </a:fontRef>
+        </p:style>
+      </p:cxnSp>
+      <p:cxnSp>
+        <p:nvCxnSpPr>
+          <p:cNvPr id="75" name="Straight Arrow Connector 74"/>
+          <p:cNvCxnSpPr>
+            <a:stCxn id="15" idx="3"/>
+            <a:endCxn id="116" idx="1"/>
+          </p:cNvCxnSpPr>
+          <p:nvPr/>
+        </p:nvCxnSpPr>
+        <p:spPr>
+          <a:xfrm>
+            <a:off x="3356675" y="2002381"/>
+            <a:ext cx="274511" cy="0"/>
+          </a:xfrm>
+          <a:prstGeom prst="straightConnector1">
+            <a:avLst/>
+          </a:prstGeom>
+          <a:ln>
+            <a:tailEnd type="triangle"/>
+          </a:ln>
+        </p:spPr>
+        <p:style>
+          <a:lnRef idx="1">
+            <a:schemeClr val="accent1"/>
+          </a:lnRef>
+          <a:fillRef idx="0">
+            <a:schemeClr val="accent1"/>
+          </a:fillRef>
+          <a:effectRef idx="0">
+            <a:schemeClr val="accent1"/>
+          </a:effectRef>
+          <a:fontRef idx="minor">
+            <a:schemeClr val="tx1"/>
+          </a:fontRef>
+        </p:style>
+      </p:cxnSp>
+      <p:cxnSp>
+        <p:nvCxnSpPr>
+          <p:cNvPr id="77" name="Straight Arrow Connector 76"/>
+          <p:cNvCxnSpPr>
+            <a:stCxn id="116" idx="3"/>
+          </p:cNvCxnSpPr>
+          <p:nvPr/>
+        </p:nvCxnSpPr>
+        <p:spPr>
+          <a:xfrm>
+            <a:off x="4718353" y="2002381"/>
+            <a:ext cx="353565" cy="643328"/>
+          </a:xfrm>
+          <a:prstGeom prst="straightConnector1">
+            <a:avLst/>
+          </a:prstGeom>
+          <a:ln>
+            <a:tailEnd type="triangle"/>
+          </a:ln>
+        </p:spPr>
+        <p:style>
+          <a:lnRef idx="1">
+            <a:schemeClr val="accent1"/>
+          </a:lnRef>
+          <a:fillRef idx="0">
+            <a:schemeClr val="accent1"/>
+          </a:fillRef>
+          <a:effectRef idx="0">
+            <a:schemeClr val="accent1"/>
+          </a:effectRef>
+          <a:fontRef idx="minor">
+            <a:schemeClr val="tx1"/>
+          </a:fontRef>
+        </p:style>
+      </p:cxnSp>
+      <p:cxnSp>
+        <p:nvCxnSpPr>
+          <p:cNvPr id="88" name="Straight Arrow Connector 87"/>
+          <p:cNvCxnSpPr>
+            <a:stCxn id="117" idx="3"/>
+            <a:endCxn id="127" idx="1"/>
+          </p:cNvCxnSpPr>
+          <p:nvPr/>
+        </p:nvCxnSpPr>
+        <p:spPr>
+          <a:xfrm flipV="1">
+            <a:off x="4037708" y="3057499"/>
+            <a:ext cx="1033014" cy="663428"/>
+          </a:xfrm>
+          <a:prstGeom prst="straightConnector1">
+            <a:avLst/>
+          </a:prstGeom>
+          <a:ln>
+            <a:tailEnd type="triangle"/>
+          </a:ln>
+        </p:spPr>
+        <p:style>
+          <a:lnRef idx="1">
+            <a:schemeClr val="accent1"/>
+          </a:lnRef>
+          <a:fillRef idx="0">
+            <a:schemeClr val="accent1"/>
+          </a:fillRef>
+          <a:effectRef idx="0">
+            <a:schemeClr val="accent1"/>
+          </a:effectRef>
+          <a:fontRef idx="minor">
+            <a:schemeClr val="tx1"/>
+          </a:fontRef>
+        </p:style>
+      </p:cxnSp>
+      <p:cxnSp>
+        <p:nvCxnSpPr>
+          <p:cNvPr id="93" name="Straight Arrow Connector 92"/>
+          <p:cNvCxnSpPr/>
+          <p:nvPr/>
+        </p:nvCxnSpPr>
+        <p:spPr>
+          <a:xfrm flipV="1">
+            <a:off x="3242266" y="3546131"/>
+            <a:ext cx="1828456" cy="1976674"/>
           </a:xfrm>
           <a:prstGeom prst="straightConnector1">
             <a:avLst/>
@@ -6202,278 +5988,308 @@
           <a:p>
             <a:pPr lvl="1"/>
             <a:r>
-              <a:rPr lang="fr-FR" sz="1200" dirty="0" smtClean="0"/>
-              <a:t>GND</a:t>
-            </a:r>
+              <a:rPr lang="fr-FR" sz="1100" dirty="0" smtClean="0"/>
+              <a:t>1. GND</a:t>
+            </a:r>
+            <a:endParaRPr lang="fr-FR" sz="1100" dirty="0" smtClean="0"/>
           </a:p>
           <a:p>
             <a:pPr lvl="1"/>
             <a:r>
-              <a:rPr lang="fr-FR" sz="1200" dirty="0" smtClean="0"/>
-              <a:t>PIN 27 : </a:t>
-            </a:r>
-            <a:r>
-              <a:rPr lang="fr-FR" sz="1200" dirty="0"/>
+              <a:rPr lang="fr-FR" sz="1100" dirty="0" smtClean="0"/>
+              <a:t>2. PIN </a:t>
+            </a:r>
+            <a:r>
+              <a:rPr lang="fr-FR" sz="1100" dirty="0" smtClean="0"/>
+              <a:t>27 : </a:t>
+            </a:r>
+            <a:r>
+              <a:rPr lang="fr-FR" sz="1100" dirty="0"/>
               <a:t>Bouton ON-OFF (Entrée</a:t>
             </a:r>
             <a:r>
-              <a:rPr lang="fr-FR" sz="1200" dirty="0" smtClean="0"/>
+              <a:rPr lang="fr-FR" sz="1100" dirty="0" smtClean="0"/>
               <a:t>)</a:t>
             </a:r>
           </a:p>
           <a:p>
             <a:pPr lvl="1"/>
             <a:r>
-              <a:rPr lang="fr-FR" sz="1200" dirty="0" smtClean="0"/>
-              <a:t>PIN 00 : Récepteur Infra Rouge (Entrée)</a:t>
-            </a:r>
+              <a:rPr lang="fr-FR" sz="1100" dirty="0" smtClean="0"/>
+              <a:t>3. PIN </a:t>
+            </a:r>
+            <a:r>
+              <a:rPr lang="fr-FR" sz="1100" dirty="0"/>
+              <a:t>00 : </a:t>
+            </a:r>
+            <a:r>
+              <a:rPr lang="fr-FR" sz="1100" dirty="0" smtClean="0"/>
+              <a:t>I2C Volume (Sortie)</a:t>
+            </a:r>
+            <a:endParaRPr lang="fr-FR" sz="1100" dirty="0" smtClean="0"/>
           </a:p>
           <a:p>
             <a:pPr lvl="1"/>
             <a:r>
-              <a:rPr lang="fr-FR" sz="1200" dirty="0" smtClean="0"/>
-              <a:t>PIN 01 : Entrée Trigger externe (Entrée)</a:t>
+              <a:rPr lang="fr-FR" sz="1100" dirty="0" smtClean="0"/>
+              <a:t>4. PIN 01 </a:t>
+            </a:r>
+            <a:r>
+              <a:rPr lang="fr-FR" sz="1100" dirty="0"/>
+              <a:t>: I2C Volume (Sortie</a:t>
+            </a:r>
+            <a:r>
+              <a:rPr lang="fr-FR" sz="1100" dirty="0" smtClean="0"/>
+              <a:t>)</a:t>
             </a:r>
           </a:p>
           <a:p>
             <a:pPr lvl="1"/>
             <a:r>
-              <a:rPr lang="fr-FR" sz="1200" dirty="0" smtClean="0"/>
-              <a:t>PIN 02 : </a:t>
-            </a:r>
-            <a:r>
-              <a:rPr lang="fr-FR" sz="1200" dirty="0"/>
-              <a:t>Bouton Sélecteur sources patte 1 (Entrée)</a:t>
-            </a:r>
-            <a:endParaRPr lang="fr-FR" sz="1200" dirty="0" smtClean="0"/>
+              <a:rPr lang="fr-FR" sz="1100" dirty="0" smtClean="0"/>
+              <a:t>5. PIN 02 </a:t>
+            </a:r>
+            <a:r>
+              <a:rPr lang="fr-FR" sz="1100" dirty="0"/>
+              <a:t>: </a:t>
+            </a:r>
+            <a:r>
+              <a:rPr lang="fr-FR" sz="1100" dirty="0" smtClean="0"/>
+              <a:t>UART </a:t>
+            </a:r>
+            <a:r>
+              <a:rPr lang="fr-FR" sz="1100" dirty="0"/>
+              <a:t>(Sortie)</a:t>
+            </a:r>
           </a:p>
           <a:p>
             <a:pPr lvl="1"/>
             <a:r>
-              <a:rPr lang="fr-FR" sz="1200" dirty="0" smtClean="0"/>
-              <a:t>PIN 03 : </a:t>
-            </a:r>
-            <a:r>
-              <a:rPr lang="fr-FR" sz="1200" dirty="0"/>
-              <a:t>Bouton Sélecteur sources patte 2 (Entrée)</a:t>
-            </a:r>
-            <a:endParaRPr lang="fr-FR" sz="1200" dirty="0" smtClean="0"/>
+              <a:rPr lang="fr-FR" sz="1100" dirty="0" smtClean="0"/>
+              <a:t>6. PIN 03 </a:t>
+            </a:r>
+            <a:r>
+              <a:rPr lang="fr-FR" sz="1100" dirty="0"/>
+              <a:t>: </a:t>
+            </a:r>
+            <a:r>
+              <a:rPr lang="fr-FR" sz="1100" dirty="0" smtClean="0"/>
+              <a:t>UART </a:t>
+            </a:r>
+            <a:r>
+              <a:rPr lang="fr-FR" sz="1100" dirty="0"/>
+              <a:t>(Sortie</a:t>
+            </a:r>
+            <a:r>
+              <a:rPr lang="fr-FR" sz="1100" dirty="0" smtClean="0"/>
+              <a:t>)</a:t>
+            </a:r>
+            <a:endParaRPr lang="fr-FR" sz="1100" dirty="0"/>
           </a:p>
           <a:p>
             <a:pPr lvl="1"/>
             <a:r>
-              <a:rPr lang="fr-FR" sz="1200" dirty="0" smtClean="0"/>
-              <a:t>PIN 04 :</a:t>
-            </a:r>
-            <a:r>
-              <a:rPr lang="fr-FR" sz="1200" dirty="0"/>
-              <a:t> Select Entrée 1 [Numérique 1] (Sortie)</a:t>
-            </a:r>
-            <a:endParaRPr lang="fr-FR" sz="1200" dirty="0" smtClean="0"/>
+              <a:rPr lang="fr-FR" sz="1100" dirty="0" smtClean="0"/>
+              <a:t>7. PIN 04 </a:t>
+            </a:r>
+            <a:r>
+              <a:rPr lang="fr-FR" sz="1100" dirty="0"/>
+              <a:t>: Entrée Trigger externe (Entrée)</a:t>
+            </a:r>
           </a:p>
           <a:p>
             <a:pPr lvl="1"/>
             <a:r>
-              <a:rPr lang="fr-FR" sz="1200" dirty="0" smtClean="0"/>
-              <a:t>PIN 05 :</a:t>
-            </a:r>
-            <a:r>
-              <a:rPr lang="fr-FR" sz="1200" dirty="0"/>
-              <a:t> Select Entrée 2 [Numérique 2] (Sortie)</a:t>
-            </a:r>
-            <a:endParaRPr lang="fr-FR" sz="1200" dirty="0" smtClean="0"/>
+              <a:rPr lang="fr-FR" sz="1100" dirty="0" smtClean="0"/>
+              <a:t>8. PIN 05 </a:t>
+            </a:r>
+            <a:r>
+              <a:rPr lang="fr-FR" sz="1100" dirty="0"/>
+              <a:t>: Récepteur Infra Rouge (Entrée</a:t>
+            </a:r>
+            <a:r>
+              <a:rPr lang="fr-FR" sz="1100" dirty="0" smtClean="0"/>
+              <a:t>)</a:t>
+            </a:r>
           </a:p>
           <a:p>
             <a:pPr lvl="1"/>
             <a:r>
-              <a:rPr lang="fr-FR" sz="1200" dirty="0" smtClean="0"/>
-              <a:t>PIN 06 : </a:t>
-            </a:r>
-            <a:r>
-              <a:rPr lang="fr-FR" sz="1200" dirty="0" err="1" smtClean="0"/>
-              <a:t>Reserved</a:t>
-            </a:r>
-            <a:endParaRPr lang="fr-FR" sz="1200" dirty="0" smtClean="0"/>
+              <a:rPr lang="fr-FR" sz="1100" dirty="0" smtClean="0"/>
+              <a:t>9.</a:t>
+            </a:r>
           </a:p>
           <a:p>
             <a:pPr lvl="1"/>
             <a:r>
-              <a:rPr lang="fr-FR" sz="1200" dirty="0" smtClean="0"/>
-              <a:t>PIN 07 :</a:t>
-            </a:r>
-            <a:r>
-              <a:rPr lang="fr-FR" sz="1200" dirty="0"/>
-              <a:t> Select Entrée 3 [Numérique 3] (Sortie)</a:t>
-            </a:r>
-            <a:endParaRPr lang="fr-FR" sz="1200" dirty="0" smtClean="0"/>
+              <a:rPr lang="fr-FR" sz="1100" dirty="0" smtClean="0"/>
+              <a:t>10.</a:t>
+            </a:r>
           </a:p>
           <a:p>
             <a:pPr lvl="1"/>
             <a:r>
-              <a:rPr lang="fr-FR" sz="1200" dirty="0" smtClean="0"/>
-              <a:t>PIN 08 :</a:t>
-            </a:r>
-            <a:r>
-              <a:rPr lang="fr-FR" sz="1200" dirty="0"/>
-              <a:t> Select Entrée 4 [Numérique 4] (Sortie)</a:t>
-            </a:r>
-            <a:endParaRPr lang="fr-FR" sz="1200" dirty="0" smtClean="0"/>
+              <a:rPr lang="fr-FR" sz="1100" dirty="0" smtClean="0"/>
+              <a:t>11.</a:t>
+            </a:r>
           </a:p>
           <a:p>
             <a:pPr lvl="1"/>
             <a:r>
-              <a:rPr lang="fr-FR" sz="1200" dirty="0" smtClean="0"/>
-              <a:t>PIN 09 :</a:t>
-            </a:r>
-            <a:r>
-              <a:rPr lang="fr-FR" sz="1200" dirty="0"/>
-              <a:t> Select Entrée 5 [USB] (Sortie)</a:t>
-            </a:r>
-            <a:endParaRPr lang="fr-FR" sz="1200" dirty="0" smtClean="0"/>
+              <a:rPr lang="fr-FR" sz="1100" dirty="0" smtClean="0"/>
+              <a:t>12.</a:t>
+            </a:r>
           </a:p>
           <a:p>
             <a:pPr lvl="1"/>
             <a:r>
-              <a:rPr lang="fr-FR" sz="1200" dirty="0" smtClean="0"/>
-              <a:t>PIN 10 :</a:t>
-            </a:r>
-            <a:r>
-              <a:rPr lang="fr-FR" sz="1200" dirty="0"/>
-              <a:t> Select Entrée 6 [Analogique 1 Aux] (Sortie)</a:t>
-            </a:r>
-            <a:endParaRPr lang="fr-FR" sz="1200" dirty="0" smtClean="0"/>
+              <a:rPr lang="fr-FR" sz="1100" dirty="0" smtClean="0"/>
+              <a:t>13.</a:t>
+            </a:r>
           </a:p>
           <a:p>
             <a:pPr lvl="1"/>
             <a:r>
-              <a:rPr lang="fr-FR" sz="1200" dirty="0" smtClean="0"/>
-              <a:t>PIN 11 :</a:t>
-            </a:r>
-            <a:r>
-              <a:rPr lang="fr-FR" sz="1200" dirty="0"/>
-              <a:t> Select Entrée 7 [Analogique 2 Phono] (Sortie)</a:t>
-            </a:r>
-            <a:endParaRPr lang="fr-FR" sz="1200" dirty="0" smtClean="0"/>
+              <a:rPr lang="fr-FR" sz="1100" dirty="0" smtClean="0"/>
+              <a:t>14. </a:t>
+            </a:r>
+            <a:r>
+              <a:rPr lang="fr-FR" sz="1100" dirty="0"/>
+              <a:t>PIN </a:t>
+            </a:r>
+            <a:r>
+              <a:rPr lang="fr-FR" sz="1100" dirty="0" smtClean="0"/>
+              <a:t>11 </a:t>
+            </a:r>
+            <a:r>
+              <a:rPr lang="fr-FR" sz="1100" dirty="0"/>
+              <a:t>: Select Entrée 1 [Numérique 1] (Sortie)</a:t>
+            </a:r>
+            <a:endParaRPr lang="fr-FR" sz="1100" dirty="0" smtClean="0"/>
           </a:p>
           <a:p>
             <a:pPr lvl="1"/>
             <a:r>
-              <a:rPr lang="fr-FR" sz="1200" dirty="0" smtClean="0"/>
-              <a:t>PIN 12 :</a:t>
-            </a:r>
-            <a:r>
-              <a:rPr lang="fr-FR" sz="1200" dirty="0"/>
-              <a:t> Select Volume </a:t>
-            </a:r>
-            <a:r>
-              <a:rPr lang="fr-FR" sz="1200" dirty="0" smtClean="0"/>
-              <a:t>Aigu Droite </a:t>
-            </a:r>
-            <a:r>
-              <a:rPr lang="fr-FR" sz="1200" dirty="0"/>
-              <a:t>(Sortie)</a:t>
-            </a:r>
-            <a:endParaRPr lang="fr-FR" sz="1200" dirty="0" smtClean="0"/>
+              <a:rPr lang="fr-FR" sz="1100" dirty="0" smtClean="0"/>
+              <a:t>15. </a:t>
+            </a:r>
+            <a:r>
+              <a:rPr lang="fr-FR" sz="1100" dirty="0"/>
+              <a:t>PIN </a:t>
+            </a:r>
+            <a:r>
+              <a:rPr lang="fr-FR" sz="1100" dirty="0" smtClean="0"/>
+              <a:t>12 </a:t>
+            </a:r>
+            <a:r>
+              <a:rPr lang="fr-FR" sz="1100" dirty="0"/>
+              <a:t>: Select Entrée 2 [Numérique 2] (Sortie)</a:t>
+            </a:r>
+            <a:endParaRPr lang="fr-FR" sz="1100" dirty="0" smtClean="0"/>
           </a:p>
           <a:p>
             <a:pPr lvl="1"/>
             <a:r>
-              <a:rPr lang="fr-FR" sz="1200" dirty="0" smtClean="0"/>
-              <a:t>PIN 13 :</a:t>
-            </a:r>
-            <a:r>
-              <a:rPr lang="fr-FR" sz="1200" dirty="0"/>
-              <a:t> Select Volume </a:t>
-            </a:r>
-            <a:r>
-              <a:rPr lang="fr-FR" sz="1200" dirty="0" smtClean="0"/>
-              <a:t>Aigu Gauche </a:t>
-            </a:r>
-            <a:r>
-              <a:rPr lang="fr-FR" sz="1200" dirty="0"/>
-              <a:t>(Sortie)</a:t>
-            </a:r>
-            <a:endParaRPr lang="fr-FR" sz="1200" dirty="0" smtClean="0"/>
+              <a:rPr lang="fr-FR" sz="1100" dirty="0" smtClean="0"/>
+              <a:t>16.</a:t>
+            </a:r>
+            <a:r>
+              <a:rPr lang="fr-FR" sz="1100" dirty="0"/>
+              <a:t> PIN </a:t>
+            </a:r>
+            <a:r>
+              <a:rPr lang="fr-FR" sz="1100" dirty="0" smtClean="0"/>
+              <a:t>13 </a:t>
+            </a:r>
+            <a:r>
+              <a:rPr lang="fr-FR" sz="1100" dirty="0"/>
+              <a:t>: Select Entrée 3 [Numérique 3] (Sortie)</a:t>
+            </a:r>
+            <a:endParaRPr lang="fr-FR" sz="1100" dirty="0" smtClean="0"/>
           </a:p>
           <a:p>
             <a:pPr lvl="1"/>
             <a:r>
-              <a:rPr lang="fr-FR" sz="1200" dirty="0" smtClean="0"/>
-              <a:t>PIN 14 :</a:t>
-            </a:r>
-            <a:r>
-              <a:rPr lang="fr-FR" sz="1200" dirty="0"/>
-              <a:t> Select Volume </a:t>
-            </a:r>
-            <a:r>
-              <a:rPr lang="fr-FR" sz="1200" dirty="0" smtClean="0"/>
-              <a:t>Medium Droite </a:t>
-            </a:r>
-            <a:r>
-              <a:rPr lang="fr-FR" sz="1200" dirty="0"/>
-              <a:t>(Sortie)</a:t>
-            </a:r>
-            <a:endParaRPr lang="fr-FR" sz="1200" dirty="0" smtClean="0"/>
+              <a:rPr lang="fr-FR" sz="1100" dirty="0" smtClean="0"/>
+              <a:t>17.</a:t>
+            </a:r>
+            <a:r>
+              <a:rPr lang="fr-FR" sz="1100" dirty="0"/>
+              <a:t> PIN </a:t>
+            </a:r>
+            <a:r>
+              <a:rPr lang="fr-FR" sz="1100" dirty="0" smtClean="0"/>
+              <a:t>14 </a:t>
+            </a:r>
+            <a:r>
+              <a:rPr lang="fr-FR" sz="1100" dirty="0"/>
+              <a:t>: Select Entrée 4 [Numérique 4] (Sortie)</a:t>
+            </a:r>
+            <a:endParaRPr lang="fr-FR" sz="1100" dirty="0" smtClean="0"/>
           </a:p>
           <a:p>
             <a:pPr lvl="1"/>
             <a:r>
-              <a:rPr lang="fr-FR" sz="1200" dirty="0" smtClean="0"/>
-              <a:t>PIN 15 :</a:t>
-            </a:r>
-            <a:r>
-              <a:rPr lang="fr-FR" sz="1200" dirty="0"/>
-              <a:t> Select Volume </a:t>
-            </a:r>
-            <a:r>
-              <a:rPr lang="fr-FR" sz="1200" dirty="0" smtClean="0"/>
-              <a:t>Medium </a:t>
-            </a:r>
-            <a:r>
-              <a:rPr lang="fr-FR" sz="1200" dirty="0"/>
-              <a:t>Gauche (Sortie)</a:t>
-            </a:r>
-            <a:endParaRPr lang="fr-FR" sz="1200" dirty="0" smtClean="0"/>
+              <a:rPr lang="fr-FR" sz="1100" dirty="0" smtClean="0"/>
+              <a:t>18.</a:t>
+            </a:r>
+            <a:r>
+              <a:rPr lang="fr-FR" sz="1100" dirty="0"/>
+              <a:t> </a:t>
+            </a:r>
+            <a:r>
+              <a:rPr lang="fr-FR" sz="1100" dirty="0" smtClean="0"/>
+              <a:t>PIN 15 : Select </a:t>
+            </a:r>
+            <a:r>
+              <a:rPr lang="fr-FR" sz="1100" dirty="0"/>
+              <a:t>Entrée 5 [USB] (Sortie)</a:t>
+            </a:r>
+            <a:endParaRPr lang="fr-FR" sz="1100" dirty="0" smtClean="0"/>
           </a:p>
           <a:p>
             <a:pPr lvl="1"/>
             <a:r>
-              <a:rPr lang="fr-FR" sz="1200" dirty="0" smtClean="0"/>
-              <a:t>PIN 16 : </a:t>
-            </a:r>
-            <a:r>
-              <a:rPr lang="fr-FR" sz="1200" dirty="0"/>
-              <a:t>Select Volume </a:t>
-            </a:r>
-            <a:r>
-              <a:rPr lang="fr-FR" sz="1200" dirty="0" smtClean="0"/>
-              <a:t>Grave Droite </a:t>
-            </a:r>
-            <a:r>
-              <a:rPr lang="fr-FR" sz="1200" dirty="0"/>
-              <a:t>(Sortie)</a:t>
-            </a:r>
-            <a:endParaRPr lang="fr-FR" sz="1200" dirty="0" smtClean="0"/>
+              <a:rPr lang="fr-FR" sz="1100" dirty="0" smtClean="0"/>
+              <a:t>19.</a:t>
+            </a:r>
+            <a:r>
+              <a:rPr lang="fr-FR" sz="1100" dirty="0"/>
+              <a:t> </a:t>
+            </a:r>
+            <a:r>
+              <a:rPr lang="fr-FR" sz="1100" dirty="0" smtClean="0"/>
+              <a:t>PIN 16 : Select </a:t>
+            </a:r>
+            <a:r>
+              <a:rPr lang="fr-FR" sz="1100" dirty="0"/>
+              <a:t>Entrée 6 [Analogique 1 Aux] (Sortie)</a:t>
+            </a:r>
+            <a:endParaRPr lang="fr-FR" sz="1100" dirty="0" smtClean="0"/>
           </a:p>
           <a:p>
             <a:pPr lvl="1"/>
             <a:r>
-              <a:rPr lang="fr-FR" sz="1200" dirty="0" smtClean="0"/>
-              <a:t>PIN 17 :</a:t>
-            </a:r>
-            <a:r>
-              <a:rPr lang="fr-FR" sz="1200" dirty="0"/>
-              <a:t> Select Volume </a:t>
-            </a:r>
-            <a:r>
-              <a:rPr lang="fr-FR" sz="1200" dirty="0" smtClean="0"/>
-              <a:t>Grave </a:t>
-            </a:r>
-            <a:r>
-              <a:rPr lang="fr-FR" sz="1200" dirty="0"/>
-              <a:t>Gauche (Sortie)</a:t>
-            </a:r>
-            <a:endParaRPr lang="fr-FR" sz="1200" dirty="0" smtClean="0"/>
+              <a:rPr lang="fr-FR" sz="1100" dirty="0" smtClean="0"/>
+              <a:t>20.</a:t>
+            </a:r>
+            <a:r>
+              <a:rPr lang="fr-FR" sz="1100" dirty="0"/>
+              <a:t> </a:t>
+            </a:r>
+            <a:r>
+              <a:rPr lang="fr-FR" sz="1100" dirty="0" smtClean="0"/>
+              <a:t>PIN 17 : Select </a:t>
+            </a:r>
+            <a:r>
+              <a:rPr lang="fr-FR" sz="1100" dirty="0"/>
+              <a:t>Entrée 7 [Analogique 2 Phono] (Sortie</a:t>
+            </a:r>
+            <a:r>
+              <a:rPr lang="fr-FR" sz="1100" dirty="0" smtClean="0"/>
+              <a:t>)</a:t>
+            </a:r>
+            <a:endParaRPr lang="fr-FR" sz="1100" dirty="0"/>
           </a:p>
         </p:txBody>
       </p:sp>
@@ -6665,377 +6481,307 @@
           <a:p>
             <a:pPr lvl="1"/>
             <a:r>
-              <a:rPr lang="fr-FR" sz="1200" dirty="0" smtClean="0"/>
-              <a:t>PIN 26 : Volume N7 (Sortie)</a:t>
+              <a:rPr lang="fr-FR" sz="1100" dirty="0" smtClean="0"/>
+              <a:t>40. +5V</a:t>
             </a:r>
           </a:p>
           <a:p>
             <a:pPr lvl="1"/>
             <a:r>
-              <a:rPr lang="fr-FR" sz="1200" dirty="0" smtClean="0"/>
-              <a:t>PIN 25 :</a:t>
-            </a:r>
-            <a:r>
-              <a:rPr lang="fr-FR" sz="1200" dirty="0"/>
-              <a:t> Volume </a:t>
-            </a:r>
-            <a:r>
-              <a:rPr lang="fr-FR" sz="1200" dirty="0" smtClean="0"/>
-              <a:t>N6 </a:t>
-            </a:r>
-            <a:r>
-              <a:rPr lang="fr-FR" sz="1200" dirty="0"/>
-              <a:t>(Sortie)</a:t>
-            </a:r>
-            <a:endParaRPr lang="fr-FR" sz="1200" dirty="0" smtClean="0"/>
+              <a:rPr lang="fr-FR" sz="1100" dirty="0" smtClean="0"/>
+              <a:t>39.</a:t>
+            </a:r>
           </a:p>
           <a:p>
             <a:pPr lvl="1"/>
             <a:r>
-              <a:rPr lang="fr-FR" sz="1200" dirty="0" smtClean="0"/>
-              <a:t>PIN 24 :</a:t>
-            </a:r>
-            <a:r>
-              <a:rPr lang="fr-FR" sz="1200" dirty="0"/>
-              <a:t> Volume </a:t>
-            </a:r>
-            <a:r>
-              <a:rPr lang="fr-FR" sz="1200" dirty="0" smtClean="0"/>
-              <a:t>N5 </a:t>
-            </a:r>
-            <a:r>
-              <a:rPr lang="fr-FR" sz="1200" dirty="0"/>
-              <a:t>(Sortie)</a:t>
-            </a:r>
-            <a:endParaRPr lang="fr-FR" sz="1200" dirty="0" smtClean="0"/>
+              <a:rPr lang="fr-FR" sz="1100" dirty="0" smtClean="0"/>
+              <a:t>38.</a:t>
+            </a:r>
           </a:p>
           <a:p>
             <a:pPr lvl="1"/>
             <a:r>
-              <a:rPr lang="fr-FR" sz="1200" dirty="0" smtClean="0"/>
-              <a:t>PIN 23 :</a:t>
-            </a:r>
-            <a:r>
-              <a:rPr lang="fr-FR" sz="1200" dirty="0"/>
-              <a:t> Volume </a:t>
-            </a:r>
-            <a:r>
-              <a:rPr lang="fr-FR" sz="1200" dirty="0" smtClean="0"/>
-              <a:t>N4 </a:t>
-            </a:r>
-            <a:r>
-              <a:rPr lang="fr-FR" sz="1200" dirty="0"/>
-              <a:t>(Sortie)</a:t>
-            </a:r>
-            <a:endParaRPr lang="fr-FR" sz="1200" dirty="0" smtClean="0"/>
+              <a:rPr lang="fr-FR" sz="1100" dirty="0" smtClean="0"/>
+              <a:t>37.</a:t>
+            </a:r>
           </a:p>
           <a:p>
             <a:pPr lvl="1"/>
             <a:r>
-              <a:rPr lang="fr-FR" sz="1200" dirty="0" smtClean="0"/>
-              <a:t>PIN 22 :</a:t>
-            </a:r>
-            <a:r>
-              <a:rPr lang="fr-FR" sz="1200" dirty="0"/>
-              <a:t> Volume </a:t>
-            </a:r>
-            <a:r>
-              <a:rPr lang="fr-FR" sz="1200" dirty="0" smtClean="0"/>
-              <a:t>N3 </a:t>
-            </a:r>
-            <a:r>
-              <a:rPr lang="fr-FR" sz="1200" dirty="0"/>
-              <a:t>(Sortie)</a:t>
-            </a:r>
-            <a:endParaRPr lang="fr-FR" sz="1200" dirty="0" smtClean="0"/>
+              <a:rPr lang="fr-FR" sz="1100" dirty="0" smtClean="0"/>
+              <a:t>36.</a:t>
+            </a:r>
           </a:p>
           <a:p>
             <a:pPr lvl="1"/>
             <a:r>
-              <a:rPr lang="fr-FR" sz="1200" dirty="0" smtClean="0"/>
-              <a:t>PIN 21 :</a:t>
-            </a:r>
-            <a:r>
-              <a:rPr lang="fr-FR" sz="1200" dirty="0"/>
-              <a:t> Volume </a:t>
-            </a:r>
-            <a:r>
-              <a:rPr lang="fr-FR" sz="1200" dirty="0" smtClean="0"/>
-              <a:t>N2 </a:t>
-            </a:r>
-            <a:r>
-              <a:rPr lang="fr-FR" sz="1200" dirty="0"/>
-              <a:t>(Sortie)</a:t>
-            </a:r>
-            <a:endParaRPr lang="fr-FR" sz="1200" dirty="0" smtClean="0"/>
+              <a:rPr lang="fr-FR" sz="1100" dirty="0" smtClean="0"/>
+              <a:t>35.</a:t>
+            </a:r>
           </a:p>
           <a:p>
             <a:pPr lvl="1"/>
             <a:r>
-              <a:rPr lang="fr-FR" sz="1200" dirty="0" smtClean="0"/>
-              <a:t>PIN 20 :</a:t>
-            </a:r>
-            <a:r>
-              <a:rPr lang="fr-FR" sz="1200" dirty="0"/>
-              <a:t> Volume </a:t>
-            </a:r>
-            <a:r>
-              <a:rPr lang="fr-FR" sz="1200" dirty="0" smtClean="0"/>
-              <a:t>N1 </a:t>
-            </a:r>
-            <a:r>
-              <a:rPr lang="fr-FR" sz="1200" dirty="0"/>
-              <a:t>(Sortie)</a:t>
-            </a:r>
-            <a:endParaRPr lang="fr-FR" sz="1200" dirty="0" smtClean="0"/>
+              <a:rPr lang="fr-FR" sz="1100" dirty="0"/>
+              <a:t>34. PIN </a:t>
+            </a:r>
+            <a:r>
+              <a:rPr lang="fr-FR" sz="1100" dirty="0" smtClean="0"/>
+              <a:t>21 </a:t>
+            </a:r>
+            <a:r>
+              <a:rPr lang="fr-FR" sz="1100" dirty="0"/>
+              <a:t>: LED </a:t>
+            </a:r>
+            <a:r>
+              <a:rPr lang="fr-FR" sz="1100" dirty="0" smtClean="0"/>
+              <a:t>OFF (</a:t>
+            </a:r>
+            <a:r>
+              <a:rPr lang="fr-FR" sz="1100" dirty="0"/>
+              <a:t>Sortie)</a:t>
+            </a:r>
+            <a:endParaRPr lang="fr-FR" sz="1100" dirty="0" smtClean="0"/>
           </a:p>
           <a:p>
             <a:pPr lvl="1"/>
             <a:r>
-              <a:rPr lang="fr-FR" sz="1200" dirty="0" smtClean="0"/>
-              <a:t>PIN 19 :</a:t>
-            </a:r>
-            <a:r>
-              <a:rPr lang="fr-FR" sz="1200" dirty="0"/>
-              <a:t> Volume </a:t>
-            </a:r>
-            <a:r>
-              <a:rPr lang="fr-FR" sz="1200" dirty="0" smtClean="0"/>
-              <a:t>N0 </a:t>
-            </a:r>
-            <a:r>
-              <a:rPr lang="fr-FR" sz="1200" dirty="0"/>
-              <a:t>(Sortie)</a:t>
-            </a:r>
-            <a:endParaRPr lang="fr-FR" sz="1200" dirty="0" smtClean="0"/>
+              <a:rPr lang="fr-FR" sz="1100" dirty="0" smtClean="0"/>
+              <a:t>33. </a:t>
+            </a:r>
+            <a:r>
+              <a:rPr lang="fr-FR" sz="1100" dirty="0"/>
+              <a:t>PIN </a:t>
+            </a:r>
+            <a:r>
+              <a:rPr lang="fr-FR" sz="1100" dirty="0" smtClean="0"/>
+              <a:t>20 </a:t>
+            </a:r>
+            <a:r>
+              <a:rPr lang="fr-FR" sz="1100" dirty="0"/>
+              <a:t>: LED </a:t>
+            </a:r>
+            <a:r>
+              <a:rPr lang="fr-FR" sz="1100" dirty="0" smtClean="0"/>
+              <a:t>ON </a:t>
+            </a:r>
+            <a:r>
+              <a:rPr lang="fr-FR" sz="1100" dirty="0"/>
+              <a:t>+ Sortie Trigger externe(Sortie)</a:t>
+            </a:r>
+            <a:endParaRPr lang="fr-FR" sz="1100" dirty="0" smtClean="0"/>
           </a:p>
           <a:p>
             <a:pPr lvl="1"/>
             <a:r>
-              <a:rPr lang="fr-FR" sz="1200" dirty="0" smtClean="0"/>
-              <a:t>PIN 18 :</a:t>
-            </a:r>
+              <a:rPr lang="fr-FR" sz="1100" dirty="0"/>
+              <a:t>32. PIN </a:t>
+            </a:r>
+            <a:r>
+              <a:rPr lang="fr-FR" sz="1100" dirty="0" smtClean="0"/>
+              <a:t>19 </a:t>
+            </a:r>
+            <a:r>
+              <a:rPr lang="fr-FR" sz="1100" dirty="0"/>
+              <a:t>: Bouton Sélecteur sources patte </a:t>
+            </a:r>
+            <a:r>
+              <a:rPr lang="fr-FR" sz="1100" dirty="0" smtClean="0"/>
+              <a:t>2 </a:t>
+            </a:r>
+            <a:r>
+              <a:rPr lang="fr-FR" sz="1100" dirty="0"/>
+              <a:t>(Entrée)</a:t>
+            </a:r>
+            <a:endParaRPr lang="fr-FR" sz="1100" dirty="0" smtClean="0"/>
           </a:p>
           <a:p>
             <a:pPr lvl="1"/>
             <a:r>
-              <a:rPr lang="fr-FR" sz="1200" dirty="0" smtClean="0"/>
-              <a:t>GND</a:t>
-            </a:r>
+              <a:rPr lang="fr-FR" sz="1100" dirty="0" smtClean="0"/>
+              <a:t>31. </a:t>
+            </a:r>
+            <a:r>
+              <a:rPr lang="fr-FR" sz="1100" dirty="0"/>
+              <a:t>PIN </a:t>
+            </a:r>
+            <a:r>
+              <a:rPr lang="fr-FR" sz="1100" dirty="0" smtClean="0"/>
+              <a:t>18 </a:t>
+            </a:r>
+            <a:r>
+              <a:rPr lang="fr-FR" sz="1100" dirty="0"/>
+              <a:t>: Bouton Sélecteur sources patte </a:t>
+            </a:r>
+            <a:r>
+              <a:rPr lang="fr-FR" sz="1100" dirty="0" smtClean="0"/>
+              <a:t>1 </a:t>
+            </a:r>
+            <a:r>
+              <a:rPr lang="fr-FR" sz="1100" dirty="0"/>
+              <a:t>(Entrée)</a:t>
+            </a:r>
+            <a:endParaRPr lang="fr-FR" sz="1100" dirty="0" smtClean="0"/>
           </a:p>
           <a:p>
             <a:pPr lvl="1"/>
             <a:r>
-              <a:rPr lang="fr-FR" sz="1200" dirty="0" smtClean="0"/>
-              <a:t>AREF</a:t>
+              <a:rPr lang="fr-FR" sz="1100" dirty="0" smtClean="0"/>
+              <a:t>30. GND</a:t>
             </a:r>
           </a:p>
           <a:p>
             <a:pPr lvl="1"/>
             <a:r>
-              <a:rPr lang="fr-FR" sz="1200" dirty="0" smtClean="0"/>
-              <a:t>PIN 38 :</a:t>
-            </a:r>
-            <a:r>
-              <a:rPr lang="fr-FR" sz="1200" dirty="0"/>
-              <a:t> LED ON/OFF + Sortie Trigger externe(Sortie)</a:t>
-            </a:r>
-            <a:endParaRPr lang="fr-FR" sz="1200" dirty="0" smtClean="0"/>
+              <a:rPr lang="fr-FR" sz="1100" dirty="0" smtClean="0"/>
+              <a:t>29. AREF = GND</a:t>
+            </a:r>
           </a:p>
           <a:p>
             <a:pPr lvl="1"/>
             <a:r>
-              <a:rPr lang="fr-FR" sz="1200" dirty="0" smtClean="0"/>
-              <a:t>PIN 39 :</a:t>
-            </a:r>
-            <a:r>
-              <a:rPr lang="fr-FR" sz="1200" dirty="0"/>
-              <a:t> Volume Plus [ctrl moteur] (Sortie) </a:t>
-            </a:r>
-            <a:endParaRPr lang="fr-FR" sz="1200" dirty="0" smtClean="0"/>
+              <a:rPr lang="fr-FR" sz="1100" dirty="0" smtClean="0"/>
+              <a:t>28. </a:t>
+            </a:r>
           </a:p>
           <a:p>
             <a:pPr lvl="1"/>
             <a:r>
-              <a:rPr lang="fr-FR" sz="1200" dirty="0" smtClean="0"/>
-              <a:t>PIN 40 :</a:t>
-            </a:r>
-            <a:r>
-              <a:rPr lang="fr-FR" sz="1200" dirty="0"/>
-              <a:t> Volume Moins [ctrl moteur] (Sortie)</a:t>
-            </a:r>
-            <a:endParaRPr lang="fr-FR" sz="1200" dirty="0" smtClean="0"/>
+              <a:rPr lang="fr-FR" sz="1100" dirty="0" smtClean="0"/>
+              <a:t>27. </a:t>
+            </a:r>
+            <a:r>
+              <a:rPr lang="fr-FR" sz="1100" dirty="0"/>
+              <a:t>PIN 39 : Volume Plus [ctrl moteur] (Sortie)</a:t>
+            </a:r>
+            <a:endParaRPr lang="fr-FR" sz="1100" dirty="0" smtClean="0"/>
           </a:p>
           <a:p>
             <a:pPr lvl="1"/>
             <a:r>
-              <a:rPr lang="fr-FR" sz="1200" dirty="0" smtClean="0"/>
-              <a:t>PIN 41 :</a:t>
-            </a:r>
-            <a:r>
-              <a:rPr lang="fr-FR" sz="1200" dirty="0"/>
-              <a:t> </a:t>
-            </a:r>
-            <a:r>
-              <a:rPr lang="fr-FR" sz="1200" dirty="0" err="1" smtClean="0"/>
+              <a:rPr lang="fr-FR" sz="1100" dirty="0"/>
+              <a:t>26. PIN 40 : Volume Moins [ctrl moteur] (Sortie)</a:t>
+            </a:r>
+            <a:endParaRPr lang="fr-FR" sz="1100" dirty="0" smtClean="0"/>
+          </a:p>
+          <a:p>
+            <a:pPr lvl="1"/>
+            <a:r>
+              <a:rPr lang="fr-FR" sz="1100" dirty="0" smtClean="0"/>
+              <a:t>25. </a:t>
+            </a:r>
+            <a:r>
+              <a:rPr lang="fr-FR" sz="1100" dirty="0"/>
+              <a:t>PIN 41 </a:t>
+            </a:r>
+            <a:r>
+              <a:rPr lang="fr-FR" sz="1100" dirty="0" smtClean="0"/>
+              <a:t>/ A3 : </a:t>
+            </a:r>
+            <a:r>
+              <a:rPr lang="fr-FR" sz="1100" dirty="0" err="1"/>
               <a:t>Sensor</a:t>
             </a:r>
             <a:r>
-              <a:rPr lang="fr-FR" sz="1200" dirty="0" smtClean="0"/>
-              <a:t> </a:t>
-            </a:r>
-            <a:r>
-              <a:rPr lang="fr-FR" sz="1200" dirty="0"/>
-              <a:t>Volume Général (Entrée)</a:t>
-            </a:r>
-            <a:endParaRPr lang="fr-FR" sz="1200" dirty="0" smtClean="0"/>
+              <a:rPr lang="fr-FR" sz="1100" dirty="0"/>
+              <a:t> Volume Général (Entrée)</a:t>
+            </a:r>
+            <a:endParaRPr lang="fr-FR" sz="1100" dirty="0" smtClean="0"/>
           </a:p>
           <a:p>
             <a:pPr lvl="1"/>
             <a:r>
-              <a:rPr lang="fr-FR" sz="1200" dirty="0" smtClean="0"/>
-              <a:t>PIN 42 :</a:t>
-            </a:r>
-            <a:r>
-              <a:rPr lang="fr-FR" sz="1200" dirty="0"/>
-              <a:t> </a:t>
-            </a:r>
-            <a:r>
-              <a:rPr lang="fr-FR" sz="1200" dirty="0" err="1"/>
+              <a:rPr lang="fr-FR" sz="1100" dirty="0"/>
+              <a:t>24. PIN 42 </a:t>
+            </a:r>
+            <a:r>
+              <a:rPr lang="fr-FR" sz="1100" dirty="0" smtClean="0"/>
+              <a:t>/ A4 : </a:t>
+            </a:r>
+            <a:r>
+              <a:rPr lang="fr-FR" sz="1100" dirty="0" err="1"/>
               <a:t>Sensor</a:t>
             </a:r>
             <a:r>
-              <a:rPr lang="fr-FR" sz="1200" dirty="0"/>
+              <a:rPr lang="fr-FR" sz="1100" dirty="0"/>
               <a:t> Balance Gauche/Droite (Entrée)</a:t>
             </a:r>
-            <a:endParaRPr lang="fr-FR" sz="1200" dirty="0" smtClean="0"/>
+            <a:endParaRPr lang="fr-FR" sz="1100" dirty="0" smtClean="0"/>
           </a:p>
           <a:p>
             <a:pPr lvl="1"/>
             <a:r>
-              <a:rPr lang="fr-FR" sz="1200" dirty="0" smtClean="0"/>
-              <a:t>PIN 43 :</a:t>
-            </a:r>
-            <a:r>
-              <a:rPr lang="fr-FR" sz="1200" dirty="0"/>
-              <a:t> </a:t>
-            </a:r>
-            <a:r>
-              <a:rPr lang="fr-FR" sz="1200" dirty="0" err="1"/>
+              <a:rPr lang="fr-FR" sz="1100" dirty="0" smtClean="0"/>
+              <a:t>23. </a:t>
+            </a:r>
+            <a:r>
+              <a:rPr lang="fr-FR" sz="1100" dirty="0"/>
+              <a:t>PIN </a:t>
+            </a:r>
+            <a:r>
+              <a:rPr lang="fr-FR" sz="1100" dirty="0" smtClean="0"/>
+              <a:t>43 / A5 : </a:t>
+            </a:r>
+            <a:r>
+              <a:rPr lang="fr-FR" sz="1100" dirty="0" err="1"/>
               <a:t>Sensor</a:t>
             </a:r>
             <a:r>
-              <a:rPr lang="fr-FR" sz="1200" dirty="0"/>
-              <a:t> Volume Grave (Entrée)</a:t>
-            </a:r>
-            <a:endParaRPr lang="fr-FR" sz="1200" dirty="0" smtClean="0"/>
+              <a:rPr lang="fr-FR" sz="1100" dirty="0"/>
+              <a:t> Volume Aigu (Entrée)</a:t>
+            </a:r>
+            <a:endParaRPr lang="fr-FR" sz="1100" dirty="0" smtClean="0"/>
           </a:p>
           <a:p>
             <a:pPr lvl="1"/>
             <a:r>
-              <a:rPr lang="fr-FR" sz="1200" dirty="0" smtClean="0"/>
-              <a:t>PIN 44 :</a:t>
-            </a:r>
-            <a:r>
-              <a:rPr lang="fr-FR" sz="1200" dirty="0"/>
-              <a:t> </a:t>
-            </a:r>
-            <a:r>
-              <a:rPr lang="fr-FR" sz="1200" dirty="0" err="1"/>
+              <a:rPr lang="fr-FR" sz="1100" dirty="0"/>
+              <a:t>22. PIN 44 </a:t>
+            </a:r>
+            <a:r>
+              <a:rPr lang="fr-FR" sz="1100" dirty="0" smtClean="0"/>
+              <a:t>/ A6 : </a:t>
+            </a:r>
+            <a:r>
+              <a:rPr lang="fr-FR" sz="1100" dirty="0" err="1"/>
               <a:t>Sensor</a:t>
             </a:r>
             <a:r>
-              <a:rPr lang="fr-FR" sz="1200" dirty="0"/>
+              <a:rPr lang="fr-FR" sz="1100" dirty="0"/>
               <a:t> Volume Medium (Entrée)</a:t>
             </a:r>
-            <a:endParaRPr lang="fr-FR" sz="1200" dirty="0" smtClean="0"/>
+            <a:endParaRPr lang="fr-FR" sz="1100" dirty="0" smtClean="0"/>
           </a:p>
           <a:p>
             <a:pPr lvl="1"/>
             <a:r>
-              <a:rPr lang="fr-FR" sz="1200" dirty="0" smtClean="0"/>
-              <a:t>PIN 45 :</a:t>
-            </a:r>
-            <a:r>
-              <a:rPr lang="fr-FR" sz="1200" dirty="0"/>
-              <a:t> </a:t>
-            </a:r>
-            <a:r>
-              <a:rPr lang="fr-FR" sz="1200" dirty="0" err="1"/>
+              <a:rPr lang="fr-FR" sz="1100" dirty="0" smtClean="0"/>
+              <a:t>21. </a:t>
+            </a:r>
+            <a:r>
+              <a:rPr lang="fr-FR" sz="1100" dirty="0"/>
+              <a:t>PIN </a:t>
+            </a:r>
+            <a:r>
+              <a:rPr lang="fr-FR" sz="1100" dirty="0" smtClean="0"/>
+              <a:t>45 / A7 </a:t>
+            </a:r>
+            <a:r>
+              <a:rPr lang="fr-FR" sz="1100" dirty="0"/>
+              <a:t>: </a:t>
+            </a:r>
+            <a:r>
+              <a:rPr lang="fr-FR" sz="1100" dirty="0" err="1"/>
               <a:t>Sensor</a:t>
             </a:r>
             <a:r>
-              <a:rPr lang="fr-FR" sz="1200" dirty="0"/>
-              <a:t> Volume Aigu (Entrée)</a:t>
-            </a:r>
-            <a:endParaRPr lang="fr-FR" sz="1200" dirty="0" smtClean="0"/>
-          </a:p>
-          <a:p>
-            <a:pPr marL="457200" lvl="1" indent="0">
-              <a:buNone/>
-            </a:pPr>
-            <a:endParaRPr lang="fr-FR" sz="1200" dirty="0" smtClean="0"/>
-          </a:p>
-          <a:p>
-            <a:pPr marL="457200" lvl="1" indent="0">
-              <a:buNone/>
-            </a:pPr>
-            <a:endParaRPr lang="fr-FR" sz="1200" dirty="0" smtClean="0"/>
-          </a:p>
-          <a:p>
-            <a:pPr lvl="1"/>
-            <a:r>
-              <a:rPr lang="fr-FR" sz="1200" dirty="0" smtClean="0"/>
-              <a:t>PIN 32 :</a:t>
-            </a:r>
-          </a:p>
-          <a:p>
-            <a:pPr lvl="1"/>
-            <a:r>
-              <a:rPr lang="fr-FR" sz="1200" dirty="0" smtClean="0"/>
-              <a:t>PIN 33 :</a:t>
-            </a:r>
-          </a:p>
-          <a:p>
-            <a:pPr lvl="1"/>
-            <a:r>
-              <a:rPr lang="fr-FR" sz="1200" dirty="0" smtClean="0"/>
-              <a:t>PIN 34 :</a:t>
-            </a:r>
-          </a:p>
-          <a:p>
-            <a:pPr lvl="1"/>
-            <a:r>
-              <a:rPr lang="fr-FR" sz="1200" dirty="0" smtClean="0"/>
-              <a:t>PIN 35 :</a:t>
-            </a:r>
-          </a:p>
-          <a:p>
-            <a:pPr lvl="1"/>
-            <a:r>
-              <a:rPr lang="fr-FR" sz="1200" dirty="0" smtClean="0"/>
-              <a:t>PIN 28 :</a:t>
-            </a:r>
-          </a:p>
-          <a:p>
-            <a:pPr lvl="1"/>
-            <a:r>
-              <a:rPr lang="fr-FR" sz="1200" dirty="0" smtClean="0"/>
-              <a:t>PIN 29 :</a:t>
-            </a:r>
-          </a:p>
-          <a:p>
-            <a:pPr lvl="1"/>
-            <a:r>
-              <a:rPr lang="fr-FR" sz="1200" dirty="0" smtClean="0"/>
-              <a:t>PIN 30 :</a:t>
-            </a:r>
-          </a:p>
-          <a:p>
-            <a:pPr lvl="1"/>
-            <a:r>
-              <a:rPr lang="fr-FR" sz="1200" dirty="0" smtClean="0"/>
-              <a:t>PIN 31 :</a:t>
+              <a:rPr lang="fr-FR" sz="1100" dirty="0"/>
+              <a:t> Volume Grave (Entrée</a:t>
+            </a:r>
+            <a:r>
+              <a:rPr lang="fr-FR" sz="1100" dirty="0" smtClean="0"/>
+              <a:t>)</a:t>
             </a:r>
           </a:p>
         </p:txBody>
@@ -7050,6 +6796,13 @@
   <p:clrMapOvr>
     <a:masterClrMapping/>
   </p:clrMapOvr>
+  <p:timing>
+    <p:tnLst>
+      <p:par>
+        <p:cTn id="1" dur="indefinite" restart="never" nodeType="tmRoot"/>
+      </p:par>
+    </p:tnLst>
+  </p:timing>
 </p:sld>
 </file>
 
@@ -7124,29 +6877,13 @@
           <a:p>
             <a:r>
               <a:rPr lang="fr-FR" dirty="0" smtClean="0"/>
-              <a:t>Si le pré-ampli s’est allumé </a:t>
-            </a:r>
+              <a:t>Si le pré-ampli s’est allumé par le trigger et que l’entrée trigger repasse au niveau bas, le pré-ampli s’éteint.</a:t>
+            </a:r>
+          </a:p>
+          <a:p>
             <a:r>
               <a:rPr lang="fr-FR" dirty="0" smtClean="0"/>
-              <a:t>par le trigger </a:t>
-            </a:r>
-            <a:r>
-              <a:rPr lang="fr-FR" dirty="0" smtClean="0"/>
-              <a:t>et que l’entrée trigger repasse au niveau bas, le pré-ampli s’éteint.</a:t>
-            </a:r>
-          </a:p>
-          <a:p>
-            <a:r>
-              <a:rPr lang="fr-FR" dirty="0" smtClean="0"/>
-              <a:t>Si le pré-ampli s’est allumé </a:t>
-            </a:r>
-            <a:r>
-              <a:rPr lang="fr-FR" dirty="0" smtClean="0"/>
-              <a:t>par le trigger </a:t>
-            </a:r>
-            <a:r>
-              <a:rPr lang="fr-FR" dirty="0" smtClean="0"/>
-              <a:t>mais que l’utilisateur l’</a:t>
+              <a:t>Si le pré-ampli s’est allumé par le trigger mais que l’utilisateur l’</a:t>
             </a:r>
             <a:r>
               <a:rPr lang="fr-FR" dirty="0"/>
@@ -7160,29 +6897,13 @@
           <a:p>
             <a:r>
               <a:rPr lang="fr-FR" dirty="0" smtClean="0"/>
-              <a:t>Si le pré-ampli s’est allumé par le trigger et éteint en force par l’utilisateur, une fois le trigger redescendu au niveau bas, le trigger peut à nouveau démarrer le pré-ampli grâce </a:t>
-            </a:r>
+              <a:t>Si le pré-ampli s’est allumé par le trigger et éteint en force par l’utilisateur, une fois le trigger redescendu au niveau bas, le trigger peut à nouveau démarrer le pré-ampli grâce à un nouveau niveau haut.</a:t>
+            </a:r>
+          </a:p>
+          <a:p>
             <a:r>
               <a:rPr lang="fr-FR" dirty="0" smtClean="0"/>
-              <a:t>à </a:t>
-            </a:r>
-            <a:r>
-              <a:rPr lang="fr-FR" dirty="0" smtClean="0"/>
-              <a:t>un nouveau niveau haut.</a:t>
-            </a:r>
-          </a:p>
-          <a:p>
-            <a:r>
-              <a:rPr lang="fr-FR" dirty="0" smtClean="0"/>
-              <a:t>Si le pré-ampli s’est allumé </a:t>
-            </a:r>
-            <a:r>
-              <a:rPr lang="fr-FR" dirty="0" smtClean="0"/>
-              <a:t>par l’utilisateur </a:t>
-            </a:r>
-            <a:r>
-              <a:rPr lang="fr-FR" dirty="0" smtClean="0"/>
-              <a:t>(bouton en façade ou télécommande), le trigger ne dois pas influer sur son état : pas d’extinction.</a:t>
+              <a:t>Si le pré-ampli s’est allumé par l’utilisateur (bouton en façade ou télécommande), le trigger ne dois pas influer sur son état : pas d’extinction.</a:t>
             </a:r>
           </a:p>
           <a:p>
@@ -7200,6 +6921,13 @@
   <p:clrMapOvr>
     <a:masterClrMapping/>
   </p:clrMapOvr>
+  <p:timing>
+    <p:tnLst>
+      <p:par>
+        <p:cTn id="1" dur="indefinite" restart="never" nodeType="tmRoot"/>
+      </p:par>
+    </p:tnLst>
+  </p:timing>
 </p:sld>
 </file>
 

</xml_diff>